<commit_message>
Added Rekursion Chapter with Example Code
</commit_message>
<xml_diff>
--- a/Java Grundkurs.pptx
+++ b/Java Grundkurs.pptx
@@ -99,8 +99,17 @@
     <p:sldId id="341" r:id="rId93"/>
     <p:sldId id="330" r:id="rId94"/>
     <p:sldId id="328" r:id="rId95"/>
-    <p:sldId id="344" r:id="rId96"/>
-    <p:sldId id="337" r:id="rId97"/>
+    <p:sldId id="361" r:id="rId96"/>
+    <p:sldId id="362" r:id="rId97"/>
+    <p:sldId id="363" r:id="rId98"/>
+    <p:sldId id="364" r:id="rId99"/>
+    <p:sldId id="365" r:id="rId100"/>
+    <p:sldId id="366" r:id="rId101"/>
+    <p:sldId id="367" r:id="rId102"/>
+    <p:sldId id="368" r:id="rId103"/>
+    <p:sldId id="369" r:id="rId104"/>
+    <p:sldId id="344" r:id="rId105"/>
+    <p:sldId id="337" r:id="rId106"/>
   </p:sldIdLst>
   <p:sldSz cx="12192000" cy="6858000"/>
   <p:notesSz cx="6858000" cy="9144000"/>
@@ -257,7 +266,7 @@
           <a:noFill/>
           <a:extLst>
             <a:ext uri="{909E8E84-426E-40dd-AFC4-6F175D3DCCD1}">
-              <a14:hiddenFill xmlns="" xmlns:a14="http://schemas.microsoft.com/office/drawing/2010/main">
+              <a14:hiddenFill xmlns:a14="http://schemas.microsoft.com/office/drawing/2010/main" xmlns="">
                 <a:solidFill>
                   <a:srgbClr val="FFFFFF"/>
                 </a:solidFill>
@@ -317,7 +326,7 @@
             </a:ln>
             <a:extLst>
               <a:ext uri="{91240B29-F687-4f45-9708-019B960494DF}">
-                <a14:hiddenLine xmlns="" xmlns:a14="http://schemas.microsoft.com/office/drawing/2010/main" w="9525">
+                <a14:hiddenLine xmlns:a14="http://schemas.microsoft.com/office/drawing/2010/main" xmlns="" w="9525">
                   <a:solidFill>
                     <a:srgbClr val="000000"/>
                   </a:solidFill>
@@ -407,7 +416,7 @@
             </a:ln>
             <a:extLst>
               <a:ext uri="{91240B29-F687-4f45-9708-019B960494DF}">
-                <a14:hiddenLine xmlns="" xmlns:a14="http://schemas.microsoft.com/office/drawing/2010/main" w="9525">
+                <a14:hiddenLine xmlns:a14="http://schemas.microsoft.com/office/drawing/2010/main" xmlns="" w="9525">
                   <a:solidFill>
                     <a:srgbClr val="000000"/>
                   </a:solidFill>
@@ -497,7 +506,7 @@
             </a:ln>
             <a:extLst>
               <a:ext uri="{91240B29-F687-4f45-9708-019B960494DF}">
-                <a14:hiddenLine xmlns="" xmlns:a14="http://schemas.microsoft.com/office/drawing/2010/main" w="9525">
+                <a14:hiddenLine xmlns:a14="http://schemas.microsoft.com/office/drawing/2010/main" xmlns="" w="9525">
                   <a:solidFill>
                     <a:srgbClr val="000000"/>
                   </a:solidFill>
@@ -531,7 +540,7 @@
             </a:ln>
             <a:extLst>
               <a:ext uri="{91240B29-F687-4f45-9708-019B960494DF}">
-                <a14:hiddenLine xmlns="" xmlns:a14="http://schemas.microsoft.com/office/drawing/2010/main" w="9525">
+                <a14:hiddenLine xmlns:a14="http://schemas.microsoft.com/office/drawing/2010/main" xmlns="" w="9525">
                   <a:solidFill>
                     <a:srgbClr val="000000"/>
                   </a:solidFill>
@@ -621,7 +630,7 @@
             </a:ln>
             <a:extLst>
               <a:ext uri="{91240B29-F687-4f45-9708-019B960494DF}">
-                <a14:hiddenLine xmlns="" xmlns:a14="http://schemas.microsoft.com/office/drawing/2010/main" w="9525">
+                <a14:hiddenLine xmlns:a14="http://schemas.microsoft.com/office/drawing/2010/main" xmlns="" w="9525">
                   <a:solidFill>
                     <a:srgbClr val="000000"/>
                   </a:solidFill>
@@ -683,7 +692,7 @@
             </a:ln>
             <a:extLst>
               <a:ext uri="{91240B29-F687-4f45-9708-019B960494DF}">
-                <a14:hiddenLine xmlns="" xmlns:a14="http://schemas.microsoft.com/office/drawing/2010/main" w="9525">
+                <a14:hiddenLine xmlns:a14="http://schemas.microsoft.com/office/drawing/2010/main" xmlns="" w="9525">
                   <a:solidFill>
                     <a:srgbClr val="000000"/>
                   </a:solidFill>
@@ -745,7 +754,7 @@
             </a:ln>
             <a:extLst>
               <a:ext uri="{91240B29-F687-4f45-9708-019B960494DF}">
-                <a14:hiddenLine xmlns="" xmlns:a14="http://schemas.microsoft.com/office/drawing/2010/main" w="9525">
+                <a14:hiddenLine xmlns:a14="http://schemas.microsoft.com/office/drawing/2010/main" xmlns="" w="9525">
                   <a:solidFill>
                     <a:srgbClr val="000000"/>
                   </a:solidFill>
@@ -835,7 +844,7 @@
             </a:ln>
             <a:extLst>
               <a:ext uri="{91240B29-F687-4f45-9708-019B960494DF}">
-                <a14:hiddenLine xmlns="" xmlns:a14="http://schemas.microsoft.com/office/drawing/2010/main" w="9525">
+                <a14:hiddenLine xmlns:a14="http://schemas.microsoft.com/office/drawing/2010/main" xmlns="" w="9525">
                   <a:solidFill>
                     <a:srgbClr val="000000"/>
                   </a:solidFill>
@@ -897,7 +906,7 @@
             </a:ln>
             <a:extLst>
               <a:ext uri="{91240B29-F687-4f45-9708-019B960494DF}">
-                <a14:hiddenLine xmlns="" xmlns:a14="http://schemas.microsoft.com/office/drawing/2010/main" w="9525">
+                <a14:hiddenLine xmlns:a14="http://schemas.microsoft.com/office/drawing/2010/main" xmlns="" w="9525">
                   <a:solidFill>
                     <a:srgbClr val="000000"/>
                   </a:solidFill>
@@ -959,7 +968,7 @@
             </a:ln>
             <a:extLst>
               <a:ext uri="{91240B29-F687-4f45-9708-019B960494DF}">
-                <a14:hiddenLine xmlns="" xmlns:a14="http://schemas.microsoft.com/office/drawing/2010/main" w="9525">
+                <a14:hiddenLine xmlns:a14="http://schemas.microsoft.com/office/drawing/2010/main" xmlns="" w="9525">
                   <a:solidFill>
                     <a:srgbClr val="000000"/>
                   </a:solidFill>
@@ -1049,7 +1058,7 @@
             </a:ln>
             <a:extLst>
               <a:ext uri="{91240B29-F687-4f45-9708-019B960494DF}">
-                <a14:hiddenLine xmlns="" xmlns:a14="http://schemas.microsoft.com/office/drawing/2010/main" w="9525">
+                <a14:hiddenLine xmlns:a14="http://schemas.microsoft.com/office/drawing/2010/main" xmlns="" w="9525">
                   <a:solidFill>
                     <a:srgbClr val="000000"/>
                   </a:solidFill>
@@ -1139,7 +1148,7 @@
             </a:ln>
             <a:extLst>
               <a:ext uri="{91240B29-F687-4f45-9708-019B960494DF}">
-                <a14:hiddenLine xmlns="" xmlns:a14="http://schemas.microsoft.com/office/drawing/2010/main" w="9525">
+                <a14:hiddenLine xmlns:a14="http://schemas.microsoft.com/office/drawing/2010/main" xmlns="" w="9525">
                   <a:solidFill>
                     <a:srgbClr val="000000"/>
                   </a:solidFill>
@@ -1201,7 +1210,7 @@
             </a:ln>
             <a:extLst>
               <a:ext uri="{91240B29-F687-4f45-9708-019B960494DF}">
-                <a14:hiddenLine xmlns="" xmlns:a14="http://schemas.microsoft.com/office/drawing/2010/main" w="9525">
+                <a14:hiddenLine xmlns:a14="http://schemas.microsoft.com/office/drawing/2010/main" xmlns="" w="9525">
                   <a:solidFill>
                     <a:srgbClr val="000000"/>
                   </a:solidFill>
@@ -1311,7 +1320,7 @@
             </a:ln>
             <a:extLst>
               <a:ext uri="{91240B29-F687-4f45-9708-019B960494DF}">
-                <a14:hiddenLine xmlns="" xmlns:a14="http://schemas.microsoft.com/office/drawing/2010/main" w="9525">
+                <a14:hiddenLine xmlns:a14="http://schemas.microsoft.com/office/drawing/2010/main" xmlns="" w="9525">
                   <a:solidFill>
                     <a:srgbClr val="000000"/>
                   </a:solidFill>
@@ -1373,7 +1382,7 @@
             </a:ln>
             <a:extLst>
               <a:ext uri="{91240B29-F687-4f45-9708-019B960494DF}">
-                <a14:hiddenLine xmlns="" xmlns:a14="http://schemas.microsoft.com/office/drawing/2010/main" w="9525">
+                <a14:hiddenLine xmlns:a14="http://schemas.microsoft.com/office/drawing/2010/main" xmlns="" w="9525">
                   <a:solidFill>
                     <a:srgbClr val="000000"/>
                   </a:solidFill>
@@ -1463,7 +1472,7 @@
             </a:ln>
             <a:extLst>
               <a:ext uri="{91240B29-F687-4f45-9708-019B960494DF}">
-                <a14:hiddenLine xmlns="" xmlns:a14="http://schemas.microsoft.com/office/drawing/2010/main" w="9525">
+                <a14:hiddenLine xmlns:a14="http://schemas.microsoft.com/office/drawing/2010/main" xmlns="" w="9525">
                   <a:solidFill>
                     <a:srgbClr val="000000"/>
                   </a:solidFill>
@@ -1553,7 +1562,7 @@
             </a:ln>
             <a:extLst>
               <a:ext uri="{91240B29-F687-4f45-9708-019B960494DF}">
-                <a14:hiddenLine xmlns="" xmlns:a14="http://schemas.microsoft.com/office/drawing/2010/main" w="9525">
+                <a14:hiddenLine xmlns:a14="http://schemas.microsoft.com/office/drawing/2010/main" xmlns="" w="9525">
                   <a:solidFill>
                     <a:srgbClr val="000000"/>
                   </a:solidFill>
@@ -1615,7 +1624,7 @@
             </a:ln>
             <a:extLst>
               <a:ext uri="{91240B29-F687-4f45-9708-019B960494DF}">
-                <a14:hiddenLine xmlns="" xmlns:a14="http://schemas.microsoft.com/office/drawing/2010/main" w="9525">
+                <a14:hiddenLine xmlns:a14="http://schemas.microsoft.com/office/drawing/2010/main" xmlns="" w="9525">
                   <a:solidFill>
                     <a:srgbClr val="000000"/>
                   </a:solidFill>
@@ -1705,7 +1714,7 @@
             </a:ln>
             <a:extLst>
               <a:ext uri="{91240B29-F687-4f45-9708-019B960494DF}">
-                <a14:hiddenLine xmlns="" xmlns:a14="http://schemas.microsoft.com/office/drawing/2010/main" w="9525">
+                <a14:hiddenLine xmlns:a14="http://schemas.microsoft.com/office/drawing/2010/main" xmlns="" w="9525">
                   <a:solidFill>
                     <a:srgbClr val="000000"/>
                   </a:solidFill>
@@ -1795,7 +1804,7 @@
             </a:ln>
             <a:extLst>
               <a:ext uri="{91240B29-F687-4f45-9708-019B960494DF}">
-                <a14:hiddenLine xmlns="" xmlns:a14="http://schemas.microsoft.com/office/drawing/2010/main" w="9525">
+                <a14:hiddenLine xmlns:a14="http://schemas.microsoft.com/office/drawing/2010/main" xmlns="" w="9525">
                   <a:solidFill>
                     <a:srgbClr val="000000"/>
                   </a:solidFill>
@@ -1851,7 +1860,7 @@
             </a:ln>
             <a:extLst>
               <a:ext uri="{91240B29-F687-4f45-9708-019B960494DF}">
-                <a14:hiddenLine xmlns="" xmlns:a14="http://schemas.microsoft.com/office/drawing/2010/main" w="9525">
+                <a14:hiddenLine xmlns:a14="http://schemas.microsoft.com/office/drawing/2010/main" xmlns="" w="9525">
                   <a:solidFill>
                     <a:srgbClr val="000000"/>
                   </a:solidFill>
@@ -1941,7 +1950,7 @@
             </a:ln>
             <a:extLst>
               <a:ext uri="{91240B29-F687-4f45-9708-019B960494DF}">
-                <a14:hiddenLine xmlns="" xmlns:a14="http://schemas.microsoft.com/office/drawing/2010/main" w="9525">
+                <a14:hiddenLine xmlns:a14="http://schemas.microsoft.com/office/drawing/2010/main" xmlns="" w="9525">
                   <a:solidFill>
                     <a:srgbClr val="000000"/>
                   </a:solidFill>
@@ -1997,7 +2006,7 @@
             </a:ln>
             <a:extLst>
               <a:ext uri="{91240B29-F687-4f45-9708-019B960494DF}">
-                <a14:hiddenLine xmlns="" xmlns:a14="http://schemas.microsoft.com/office/drawing/2010/main" w="9525">
+                <a14:hiddenLine xmlns:a14="http://schemas.microsoft.com/office/drawing/2010/main" xmlns="" w="9525">
                   <a:solidFill>
                     <a:srgbClr val="000000"/>
                   </a:solidFill>
@@ -2087,7 +2096,7 @@
             </a:ln>
             <a:extLst>
               <a:ext uri="{91240B29-F687-4f45-9708-019B960494DF}">
-                <a14:hiddenLine xmlns="" xmlns:a14="http://schemas.microsoft.com/office/drawing/2010/main" w="9525">
+                <a14:hiddenLine xmlns:a14="http://schemas.microsoft.com/office/drawing/2010/main" xmlns="" w="9525">
                   <a:solidFill>
                     <a:srgbClr val="000000"/>
                   </a:solidFill>
@@ -2155,7 +2164,7 @@
             </a:ln>
             <a:extLst>
               <a:ext uri="{91240B29-F687-4f45-9708-019B960494DF}">
-                <a14:hiddenLine xmlns="" xmlns:a14="http://schemas.microsoft.com/office/drawing/2010/main" w="9525">
+                <a14:hiddenLine xmlns:a14="http://schemas.microsoft.com/office/drawing/2010/main" xmlns="" w="9525">
                   <a:solidFill>
                     <a:srgbClr val="000000"/>
                   </a:solidFill>
@@ -2245,7 +2254,7 @@
             </a:ln>
             <a:extLst>
               <a:ext uri="{91240B29-F687-4f45-9708-019B960494DF}">
-                <a14:hiddenLine xmlns="" xmlns:a14="http://schemas.microsoft.com/office/drawing/2010/main" w="9525">
+                <a14:hiddenLine xmlns:a14="http://schemas.microsoft.com/office/drawing/2010/main" xmlns="" w="9525">
                   <a:solidFill>
                     <a:srgbClr val="000000"/>
                   </a:solidFill>
@@ -2313,7 +2322,7 @@
             </a:ln>
             <a:extLst>
               <a:ext uri="{91240B29-F687-4f45-9708-019B960494DF}">
-                <a14:hiddenLine xmlns="" xmlns:a14="http://schemas.microsoft.com/office/drawing/2010/main" w="9525">
+                <a14:hiddenLine xmlns:a14="http://schemas.microsoft.com/office/drawing/2010/main" xmlns="" w="9525">
                   <a:solidFill>
                     <a:srgbClr val="000000"/>
                   </a:solidFill>
@@ -2403,7 +2412,7 @@
             </a:ln>
             <a:extLst>
               <a:ext uri="{91240B29-F687-4f45-9708-019B960494DF}">
-                <a14:hiddenLine xmlns="" xmlns:a14="http://schemas.microsoft.com/office/drawing/2010/main" w="9525">
+                <a14:hiddenLine xmlns:a14="http://schemas.microsoft.com/office/drawing/2010/main" xmlns="" w="9525">
                   <a:solidFill>
                     <a:srgbClr val="000000"/>
                   </a:solidFill>
@@ -2437,7 +2446,7 @@
             </a:ln>
             <a:extLst>
               <a:ext uri="{91240B29-F687-4f45-9708-019B960494DF}">
-                <a14:hiddenLine xmlns="" xmlns:a14="http://schemas.microsoft.com/office/drawing/2010/main" w="9525">
+                <a14:hiddenLine xmlns:a14="http://schemas.microsoft.com/office/drawing/2010/main" xmlns="" w="9525">
                   <a:solidFill>
                     <a:srgbClr val="000000"/>
                   </a:solidFill>
@@ -2527,7 +2536,7 @@
             </a:ln>
             <a:extLst>
               <a:ext uri="{91240B29-F687-4f45-9708-019B960494DF}">
-                <a14:hiddenLine xmlns="" xmlns:a14="http://schemas.microsoft.com/office/drawing/2010/main" w="9525">
+                <a14:hiddenLine xmlns:a14="http://schemas.microsoft.com/office/drawing/2010/main" xmlns="" w="9525">
                   <a:solidFill>
                     <a:srgbClr val="000000"/>
                   </a:solidFill>
@@ -2589,7 +2598,7 @@
             </a:ln>
             <a:extLst>
               <a:ext uri="{91240B29-F687-4f45-9708-019B960494DF}">
-                <a14:hiddenLine xmlns="" xmlns:a14="http://schemas.microsoft.com/office/drawing/2010/main" w="9525">
+                <a14:hiddenLine xmlns:a14="http://schemas.microsoft.com/office/drawing/2010/main" xmlns="" w="9525">
                   <a:solidFill>
                     <a:srgbClr val="000000"/>
                   </a:solidFill>
@@ -2651,7 +2660,7 @@
             </a:ln>
             <a:extLst>
               <a:ext uri="{91240B29-F687-4f45-9708-019B960494DF}">
-                <a14:hiddenLine xmlns="" xmlns:a14="http://schemas.microsoft.com/office/drawing/2010/main" w="9525">
+                <a14:hiddenLine xmlns:a14="http://schemas.microsoft.com/office/drawing/2010/main" xmlns="" w="9525">
                   <a:solidFill>
                     <a:srgbClr val="000000"/>
                   </a:solidFill>
@@ -2741,7 +2750,7 @@
             </a:ln>
             <a:extLst>
               <a:ext uri="{91240B29-F687-4f45-9708-019B960494DF}">
-                <a14:hiddenLine xmlns="" xmlns:a14="http://schemas.microsoft.com/office/drawing/2010/main" w="9525">
+                <a14:hiddenLine xmlns:a14="http://schemas.microsoft.com/office/drawing/2010/main" xmlns="" w="9525">
                   <a:solidFill>
                     <a:srgbClr val="000000"/>
                   </a:solidFill>
@@ -2809,7 +2818,7 @@
             </a:ln>
             <a:extLst>
               <a:ext uri="{91240B29-F687-4f45-9708-019B960494DF}">
-                <a14:hiddenLine xmlns="" xmlns:a14="http://schemas.microsoft.com/office/drawing/2010/main" w="9525">
+                <a14:hiddenLine xmlns:a14="http://schemas.microsoft.com/office/drawing/2010/main" xmlns="" w="9525">
                   <a:solidFill>
                     <a:srgbClr val="000000"/>
                   </a:solidFill>
@@ -2871,7 +2880,7 @@
             </a:ln>
             <a:extLst>
               <a:ext uri="{91240B29-F687-4f45-9708-019B960494DF}">
-                <a14:hiddenLine xmlns="" xmlns:a14="http://schemas.microsoft.com/office/drawing/2010/main" w="9525">
+                <a14:hiddenLine xmlns:a14="http://schemas.microsoft.com/office/drawing/2010/main" xmlns="" w="9525">
                   <a:solidFill>
                     <a:srgbClr val="000000"/>
                   </a:solidFill>
@@ -2961,7 +2970,7 @@
             </a:ln>
             <a:extLst>
               <a:ext uri="{91240B29-F687-4f45-9708-019B960494DF}">
-                <a14:hiddenLine xmlns="" xmlns:a14="http://schemas.microsoft.com/office/drawing/2010/main" w="9525">
+                <a14:hiddenLine xmlns:a14="http://schemas.microsoft.com/office/drawing/2010/main" xmlns="" w="9525">
                   <a:solidFill>
                     <a:srgbClr val="000000"/>
                   </a:solidFill>
@@ -3023,7 +3032,7 @@
             </a:ln>
             <a:extLst>
               <a:ext uri="{91240B29-F687-4f45-9708-019B960494DF}">
-                <a14:hiddenLine xmlns="" xmlns:a14="http://schemas.microsoft.com/office/drawing/2010/main" w="9525">
+                <a14:hiddenLine xmlns:a14="http://schemas.microsoft.com/office/drawing/2010/main" xmlns="" w="9525">
                   <a:solidFill>
                     <a:srgbClr val="000000"/>
                   </a:solidFill>
@@ -3113,7 +3122,7 @@
             </a:ln>
             <a:extLst>
               <a:ext uri="{91240B29-F687-4f45-9708-019B960494DF}">
-                <a14:hiddenLine xmlns="" xmlns:a14="http://schemas.microsoft.com/office/drawing/2010/main" w="9525">
+                <a14:hiddenLine xmlns:a14="http://schemas.microsoft.com/office/drawing/2010/main" xmlns="" w="9525">
                   <a:solidFill>
                     <a:srgbClr val="000000"/>
                   </a:solidFill>
@@ -3175,7 +3184,7 @@
             </a:ln>
             <a:extLst>
               <a:ext uri="{91240B29-F687-4f45-9708-019B960494DF}">
-                <a14:hiddenLine xmlns="" xmlns:a14="http://schemas.microsoft.com/office/drawing/2010/main" w="9525">
+                <a14:hiddenLine xmlns:a14="http://schemas.microsoft.com/office/drawing/2010/main" xmlns="" w="9525">
                   <a:solidFill>
                     <a:srgbClr val="000000"/>
                   </a:solidFill>
@@ -3265,7 +3274,7 @@
             </a:ln>
             <a:extLst>
               <a:ext uri="{91240B29-F687-4f45-9708-019B960494DF}">
-                <a14:hiddenLine xmlns="" xmlns:a14="http://schemas.microsoft.com/office/drawing/2010/main" w="9525">
+                <a14:hiddenLine xmlns:a14="http://schemas.microsoft.com/office/drawing/2010/main" xmlns="" w="9525">
                   <a:solidFill>
                     <a:srgbClr val="000000"/>
                   </a:solidFill>
@@ -3299,7 +3308,7 @@
             </a:ln>
             <a:extLst>
               <a:ext uri="{91240B29-F687-4f45-9708-019B960494DF}">
-                <a14:hiddenLine xmlns="" xmlns:a14="http://schemas.microsoft.com/office/drawing/2010/main" w="9525">
+                <a14:hiddenLine xmlns:a14="http://schemas.microsoft.com/office/drawing/2010/main" xmlns="" w="9525">
                   <a:solidFill>
                     <a:srgbClr val="000000"/>
                   </a:solidFill>
@@ -3364,7 +3373,7 @@
             </a:ln>
             <a:extLst>
               <a:ext uri="{91240B29-F687-4f45-9708-019B960494DF}">
-                <a14:hiddenLine xmlns="" xmlns:a14="http://schemas.microsoft.com/office/drawing/2010/main" w="9525">
+                <a14:hiddenLine xmlns:a14="http://schemas.microsoft.com/office/drawing/2010/main" xmlns="" w="9525">
                   <a:solidFill>
                     <a:srgbClr val="000000"/>
                   </a:solidFill>
@@ -3454,7 +3463,7 @@
             </a:ln>
             <a:extLst>
               <a:ext uri="{91240B29-F687-4f45-9708-019B960494DF}">
-                <a14:hiddenLine xmlns="" xmlns:a14="http://schemas.microsoft.com/office/drawing/2010/main" w="9525">
+                <a14:hiddenLine xmlns:a14="http://schemas.microsoft.com/office/drawing/2010/main" xmlns="" w="9525">
                   <a:solidFill>
                     <a:srgbClr val="000000"/>
                   </a:solidFill>
@@ -3516,7 +3525,7 @@
             </a:ln>
             <a:extLst>
               <a:ext uri="{91240B29-F687-4f45-9708-019B960494DF}">
-                <a14:hiddenLine xmlns="" xmlns:a14="http://schemas.microsoft.com/office/drawing/2010/main" w="9525">
+                <a14:hiddenLine xmlns:a14="http://schemas.microsoft.com/office/drawing/2010/main" xmlns="" w="9525">
                   <a:solidFill>
                     <a:srgbClr val="000000"/>
                   </a:solidFill>
@@ -3606,7 +3615,7 @@
             </a:ln>
             <a:extLst>
               <a:ext uri="{91240B29-F687-4f45-9708-019B960494DF}">
-                <a14:hiddenLine xmlns="" xmlns:a14="http://schemas.microsoft.com/office/drawing/2010/main" w="9525">
+                <a14:hiddenLine xmlns:a14="http://schemas.microsoft.com/office/drawing/2010/main" xmlns="" w="9525">
                   <a:solidFill>
                     <a:srgbClr val="000000"/>
                   </a:solidFill>
@@ -3696,7 +3705,7 @@
             </a:ln>
             <a:extLst>
               <a:ext uri="{91240B29-F687-4f45-9708-019B960494DF}">
-                <a14:hiddenLine xmlns="" xmlns:a14="http://schemas.microsoft.com/office/drawing/2010/main" w="9525">
+                <a14:hiddenLine xmlns:a14="http://schemas.microsoft.com/office/drawing/2010/main" xmlns="" w="9525">
                   <a:solidFill>
                     <a:srgbClr val="000000"/>
                   </a:solidFill>
@@ -3761,7 +3770,7 @@
             </a:ln>
             <a:extLst>
               <a:ext uri="{91240B29-F687-4f45-9708-019B960494DF}">
-                <a14:hiddenLine xmlns="" xmlns:a14="http://schemas.microsoft.com/office/drawing/2010/main" w="9525">
+                <a14:hiddenLine xmlns:a14="http://schemas.microsoft.com/office/drawing/2010/main" xmlns="" w="9525">
                   <a:solidFill>
                     <a:srgbClr val="000000"/>
                   </a:solidFill>
@@ -3823,7 +3832,7 @@
             </a:ln>
             <a:extLst>
               <a:ext uri="{91240B29-F687-4f45-9708-019B960494DF}">
-                <a14:hiddenLine xmlns="" xmlns:a14="http://schemas.microsoft.com/office/drawing/2010/main" w="9525">
+                <a14:hiddenLine xmlns:a14="http://schemas.microsoft.com/office/drawing/2010/main" xmlns="" w="9525">
                   <a:solidFill>
                     <a:srgbClr val="000000"/>
                   </a:solidFill>
@@ -3913,7 +3922,7 @@
             </a:ln>
             <a:extLst>
               <a:ext uri="{91240B29-F687-4f45-9708-019B960494DF}">
-                <a14:hiddenLine xmlns="" xmlns:a14="http://schemas.microsoft.com/office/drawing/2010/main" w="9525">
+                <a14:hiddenLine xmlns:a14="http://schemas.microsoft.com/office/drawing/2010/main" xmlns="" w="9525">
                   <a:solidFill>
                     <a:srgbClr val="000000"/>
                   </a:solidFill>
@@ -4003,7 +4012,7 @@
             </a:ln>
             <a:extLst>
               <a:ext uri="{91240B29-F687-4f45-9708-019B960494DF}">
-                <a14:hiddenLine xmlns="" xmlns:a14="http://schemas.microsoft.com/office/drawing/2010/main" w="9525">
+                <a14:hiddenLine xmlns:a14="http://schemas.microsoft.com/office/drawing/2010/main" xmlns="" w="9525">
                   <a:solidFill>
                     <a:srgbClr val="000000"/>
                   </a:solidFill>
@@ -4065,7 +4074,7 @@
             </a:ln>
             <a:extLst>
               <a:ext uri="{91240B29-F687-4f45-9708-019B960494DF}">
-                <a14:hiddenLine xmlns="" xmlns:a14="http://schemas.microsoft.com/office/drawing/2010/main" w="9525">
+                <a14:hiddenLine xmlns:a14="http://schemas.microsoft.com/office/drawing/2010/main" xmlns="" w="9525">
                   <a:solidFill>
                     <a:srgbClr val="000000"/>
                   </a:solidFill>
@@ -4185,7 +4194,7 @@
             </a:ln>
             <a:extLst>
               <a:ext uri="{91240B29-F687-4f45-9708-019B960494DF}">
-                <a14:hiddenLine xmlns="" xmlns:a14="http://schemas.microsoft.com/office/drawing/2010/main" w="9525">
+                <a14:hiddenLine xmlns:a14="http://schemas.microsoft.com/office/drawing/2010/main" xmlns="" w="9525">
                   <a:solidFill>
                     <a:srgbClr val="000000"/>
                   </a:solidFill>
@@ -4253,7 +4262,7 @@
             </a:ln>
             <a:extLst>
               <a:ext uri="{91240B29-F687-4f45-9708-019B960494DF}">
-                <a14:hiddenLine xmlns="" xmlns:a14="http://schemas.microsoft.com/office/drawing/2010/main" w="9525">
+                <a14:hiddenLine xmlns:a14="http://schemas.microsoft.com/office/drawing/2010/main" xmlns="" w="9525">
                   <a:solidFill>
                     <a:srgbClr val="000000"/>
                   </a:solidFill>
@@ -4343,7 +4352,7 @@
             </a:ln>
             <a:extLst>
               <a:ext uri="{91240B29-F687-4f45-9708-019B960494DF}">
-                <a14:hiddenLine xmlns="" xmlns:a14="http://schemas.microsoft.com/office/drawing/2010/main" w="9525">
+                <a14:hiddenLine xmlns:a14="http://schemas.microsoft.com/office/drawing/2010/main" xmlns="" w="9525">
                   <a:solidFill>
                     <a:srgbClr val="000000"/>
                   </a:solidFill>
@@ -4492,7 +4501,7 @@
           <a:p>
             <a:fld id="{9165E63A-FD65-4B10-BBF8-4169C1054D5D}" type="datetimeFigureOut">
               <a:rPr lang="de-DE" smtClean="0"/>
-              <a:t>26.10.2023</a:t>
+              <a:t>28.10.2023</a:t>
             </a:fld>
             <a:endParaRPr lang="de-DE"/>
           </a:p>
@@ -4779,7 +4788,7 @@
           <a:p>
             <a:fld id="{9165E63A-FD65-4B10-BBF8-4169C1054D5D}" type="datetimeFigureOut">
               <a:rPr lang="de-DE" smtClean="0"/>
-              <a:t>26.10.2023</a:t>
+              <a:t>28.10.2023</a:t>
             </a:fld>
             <a:endParaRPr lang="de-DE"/>
           </a:p>
@@ -5005,7 +5014,7 @@
           <a:p>
             <a:fld id="{9165E63A-FD65-4B10-BBF8-4169C1054D5D}" type="datetimeFigureOut">
               <a:rPr lang="de-DE" smtClean="0"/>
-              <a:t>26.10.2023</a:t>
+              <a:t>28.10.2023</a:t>
             </a:fld>
             <a:endParaRPr lang="de-DE"/>
           </a:p>
@@ -5301,7 +5310,7 @@
           <a:p>
             <a:fld id="{9165E63A-FD65-4B10-BBF8-4169C1054D5D}" type="datetimeFigureOut">
               <a:rPr lang="de-DE" smtClean="0"/>
-              <a:t>26.10.2023</a:t>
+              <a:t>28.10.2023</a:t>
             </a:fld>
             <a:endParaRPr lang="de-DE"/>
           </a:p>
@@ -5765,7 +5774,7 @@
           <a:p>
             <a:fld id="{9165E63A-FD65-4B10-BBF8-4169C1054D5D}" type="datetimeFigureOut">
               <a:rPr lang="de-DE" smtClean="0"/>
-              <a:t>26.10.2023</a:t>
+              <a:t>28.10.2023</a:t>
             </a:fld>
             <a:endParaRPr lang="de-DE"/>
           </a:p>
@@ -6356,7 +6365,7 @@
           <a:p>
             <a:fld id="{9165E63A-FD65-4B10-BBF8-4169C1054D5D}" type="datetimeFigureOut">
               <a:rPr lang="de-DE" smtClean="0"/>
-              <a:t>26.10.2023</a:t>
+              <a:t>28.10.2023</a:t>
             </a:fld>
             <a:endParaRPr lang="de-DE"/>
           </a:p>
@@ -7121,7 +7130,7 @@
           <a:p>
             <a:fld id="{9165E63A-FD65-4B10-BBF8-4169C1054D5D}" type="datetimeFigureOut">
               <a:rPr lang="de-DE" smtClean="0"/>
-              <a:t>26.10.2023</a:t>
+              <a:t>28.10.2023</a:t>
             </a:fld>
             <a:endParaRPr lang="de-DE"/>
           </a:p>
@@ -7331,7 +7340,7 @@
           <a:p>
             <a:fld id="{9165E63A-FD65-4B10-BBF8-4169C1054D5D}" type="datetimeFigureOut">
               <a:rPr lang="de-DE" smtClean="0"/>
-              <a:t>26.10.2023</a:t>
+              <a:t>28.10.2023</a:t>
             </a:fld>
             <a:endParaRPr lang="de-DE"/>
           </a:p>
@@ -7541,7 +7550,7 @@
           <a:p>
             <a:fld id="{9165E63A-FD65-4B10-BBF8-4169C1054D5D}" type="datetimeFigureOut">
               <a:rPr lang="de-DE" smtClean="0"/>
-              <a:t>26.10.2023</a:t>
+              <a:t>28.10.2023</a:t>
             </a:fld>
             <a:endParaRPr lang="de-DE"/>
           </a:p>
@@ -7751,7 +7760,7 @@
           <a:p>
             <a:fld id="{9165E63A-FD65-4B10-BBF8-4169C1054D5D}" type="datetimeFigureOut">
               <a:rPr lang="de-DE" smtClean="0"/>
-              <a:t>26.10.2023</a:t>
+              <a:t>28.10.2023</a:t>
             </a:fld>
             <a:endParaRPr lang="de-DE"/>
           </a:p>
@@ -8031,7 +8040,7 @@
           <a:p>
             <a:fld id="{9165E63A-FD65-4B10-BBF8-4169C1054D5D}" type="datetimeFigureOut">
               <a:rPr lang="de-DE" smtClean="0"/>
-              <a:t>26.10.2023</a:t>
+              <a:t>28.10.2023</a:t>
             </a:fld>
             <a:endParaRPr lang="de-DE"/>
           </a:p>
@@ -8301,7 +8310,7 @@
           <a:p>
             <a:fld id="{9165E63A-FD65-4B10-BBF8-4169C1054D5D}" type="datetimeFigureOut">
               <a:rPr lang="de-DE" smtClean="0"/>
-              <a:t>26.10.2023</a:t>
+              <a:t>28.10.2023</a:t>
             </a:fld>
             <a:endParaRPr lang="de-DE"/>
           </a:p>
@@ -8721,7 +8730,7 @@
           <a:p>
             <a:fld id="{9165E63A-FD65-4B10-BBF8-4169C1054D5D}" type="datetimeFigureOut">
               <a:rPr lang="de-DE" smtClean="0"/>
-              <a:t>26.10.2023</a:t>
+              <a:t>28.10.2023</a:t>
             </a:fld>
             <a:endParaRPr lang="de-DE"/>
           </a:p>
@@ -8871,7 +8880,7 @@
           <a:p>
             <a:fld id="{9165E63A-FD65-4B10-BBF8-4169C1054D5D}" type="datetimeFigureOut">
               <a:rPr lang="de-DE" smtClean="0"/>
-              <a:t>26.10.2023</a:t>
+              <a:t>28.10.2023</a:t>
             </a:fld>
             <a:endParaRPr lang="de-DE"/>
           </a:p>
@@ -8990,7 +8999,7 @@
           <a:p>
             <a:fld id="{9165E63A-FD65-4B10-BBF8-4169C1054D5D}" type="datetimeFigureOut">
               <a:rPr lang="de-DE" smtClean="0"/>
-              <a:t>26.10.2023</a:t>
+              <a:t>28.10.2023</a:t>
             </a:fld>
             <a:endParaRPr lang="de-DE"/>
           </a:p>
@@ -9272,7 +9281,7 @@
           <a:p>
             <a:fld id="{9165E63A-FD65-4B10-BBF8-4169C1054D5D}" type="datetimeFigureOut">
               <a:rPr lang="de-DE" smtClean="0"/>
-              <a:t>26.10.2023</a:t>
+              <a:t>28.10.2023</a:t>
             </a:fld>
             <a:endParaRPr lang="de-DE"/>
           </a:p>
@@ -9582,7 +9591,7 @@
           <a:p>
             <a:fld id="{9165E63A-FD65-4B10-BBF8-4169C1054D5D}" type="datetimeFigureOut">
               <a:rPr lang="de-DE" smtClean="0"/>
-              <a:t>26.10.2023</a:t>
+              <a:t>28.10.2023</a:t>
             </a:fld>
             <a:endParaRPr lang="de-DE"/>
           </a:p>
@@ -9763,7 +9772,7 @@
           </a:ln>
           <a:extLst>
             <a:ext uri="{91240B29-F687-4f45-9708-019B960494DF}">
-              <a14:hiddenLine xmlns="" xmlns:a14="http://schemas.microsoft.com/office/drawing/2010/main" w="9525">
+              <a14:hiddenLine xmlns:a14="http://schemas.microsoft.com/office/drawing/2010/main" xmlns="" w="9525">
                 <a:solidFill>
                   <a:srgbClr val="000000"/>
                 </a:solidFill>
@@ -9829,7 +9838,7 @@
           </a:ln>
           <a:extLst>
             <a:ext uri="{91240B29-F687-4f45-9708-019B960494DF}">
-              <a14:hiddenLine xmlns="" xmlns:a14="http://schemas.microsoft.com/office/drawing/2010/main" w="9525">
+              <a14:hiddenLine xmlns:a14="http://schemas.microsoft.com/office/drawing/2010/main" xmlns="" w="9525">
                 <a:solidFill>
                   <a:srgbClr val="000000"/>
                 </a:solidFill>
@@ -9867,7 +9876,7 @@
           </a:ln>
           <a:extLst>
             <a:ext uri="{91240B29-F687-4f45-9708-019B960494DF}">
-              <a14:hiddenLine xmlns="" xmlns:a14="http://schemas.microsoft.com/office/drawing/2010/main" w="9525">
+              <a14:hiddenLine xmlns:a14="http://schemas.microsoft.com/office/drawing/2010/main" xmlns="" w="9525">
                 <a:solidFill>
                   <a:srgbClr val="000000"/>
                 </a:solidFill>
@@ -9936,7 +9945,7 @@
           </a:ln>
           <a:extLst>
             <a:ext uri="{91240B29-F687-4f45-9708-019B960494DF}">
-              <a14:hiddenLine xmlns="" xmlns:a14="http://schemas.microsoft.com/office/drawing/2010/main" w="9525">
+              <a14:hiddenLine xmlns:a14="http://schemas.microsoft.com/office/drawing/2010/main" xmlns="" w="9525">
                 <a:solidFill>
                   <a:srgbClr val="000000"/>
                 </a:solidFill>
@@ -10030,7 +10039,7 @@
           </a:ln>
           <a:extLst>
             <a:ext uri="{91240B29-F687-4f45-9708-019B960494DF}">
-              <a14:hiddenLine xmlns="" xmlns:a14="http://schemas.microsoft.com/office/drawing/2010/main" w="9525">
+              <a14:hiddenLine xmlns:a14="http://schemas.microsoft.com/office/drawing/2010/main" xmlns="" w="9525">
                 <a:solidFill>
                   <a:srgbClr val="000000"/>
                 </a:solidFill>
@@ -10096,7 +10105,7 @@
           </a:ln>
           <a:extLst>
             <a:ext uri="{91240B29-F687-4f45-9708-019B960494DF}">
-              <a14:hiddenLine xmlns="" xmlns:a14="http://schemas.microsoft.com/office/drawing/2010/main" w="9525">
+              <a14:hiddenLine xmlns:a14="http://schemas.microsoft.com/office/drawing/2010/main" xmlns="" w="9525">
                 <a:solidFill>
                   <a:srgbClr val="000000"/>
                 </a:solidFill>
@@ -10190,7 +10199,7 @@
           </a:ln>
           <a:extLst>
             <a:ext uri="{91240B29-F687-4f45-9708-019B960494DF}">
-              <a14:hiddenLine xmlns="" xmlns:a14="http://schemas.microsoft.com/office/drawing/2010/main" w="9525">
+              <a14:hiddenLine xmlns:a14="http://schemas.microsoft.com/office/drawing/2010/main" xmlns="" w="9525">
                 <a:solidFill>
                   <a:srgbClr val="000000"/>
                 </a:solidFill>
@@ -10259,7 +10268,7 @@
           </a:ln>
           <a:extLst>
             <a:ext uri="{91240B29-F687-4f45-9708-019B960494DF}">
-              <a14:hiddenLine xmlns="" xmlns:a14="http://schemas.microsoft.com/office/drawing/2010/main" w="9525">
+              <a14:hiddenLine xmlns:a14="http://schemas.microsoft.com/office/drawing/2010/main" xmlns="" w="9525">
                 <a:solidFill>
                   <a:srgbClr val="000000"/>
                 </a:solidFill>
@@ -10325,7 +10334,7 @@
           </a:ln>
           <a:extLst>
             <a:ext uri="{91240B29-F687-4f45-9708-019B960494DF}">
-              <a14:hiddenLine xmlns="" xmlns:a14="http://schemas.microsoft.com/office/drawing/2010/main" w="9525">
+              <a14:hiddenLine xmlns:a14="http://schemas.microsoft.com/office/drawing/2010/main" xmlns="" w="9525">
                 <a:solidFill>
                   <a:srgbClr val="000000"/>
                 </a:solidFill>
@@ -10419,7 +10428,7 @@
           </a:ln>
           <a:extLst>
             <a:ext uri="{91240B29-F687-4f45-9708-019B960494DF}">
-              <a14:hiddenLine xmlns="" xmlns:a14="http://schemas.microsoft.com/office/drawing/2010/main" w="9525">
+              <a14:hiddenLine xmlns:a14="http://schemas.microsoft.com/office/drawing/2010/main" xmlns="" w="9525">
                 <a:solidFill>
                   <a:srgbClr val="000000"/>
                 </a:solidFill>
@@ -10513,7 +10522,7 @@
           </a:ln>
           <a:extLst>
             <a:ext uri="{91240B29-F687-4f45-9708-019B960494DF}">
-              <a14:hiddenLine xmlns="" xmlns:a14="http://schemas.microsoft.com/office/drawing/2010/main" w="9525">
+              <a14:hiddenLine xmlns:a14="http://schemas.microsoft.com/office/drawing/2010/main" xmlns="" w="9525">
                 <a:solidFill>
                   <a:srgbClr val="000000"/>
                 </a:solidFill>
@@ -10582,7 +10591,7 @@
           </a:ln>
           <a:extLst>
             <a:ext uri="{91240B29-F687-4f45-9708-019B960494DF}">
-              <a14:hiddenLine xmlns="" xmlns:a14="http://schemas.microsoft.com/office/drawing/2010/main" w="9525">
+              <a14:hiddenLine xmlns:a14="http://schemas.microsoft.com/office/drawing/2010/main" xmlns="" w="9525">
                 <a:solidFill>
                   <a:srgbClr val="000000"/>
                 </a:solidFill>
@@ -10706,7 +10715,7 @@
           </a:ln>
           <a:extLst>
             <a:ext uri="{91240B29-F687-4f45-9708-019B960494DF}">
-              <a14:hiddenLine xmlns="" xmlns:a14="http://schemas.microsoft.com/office/drawing/2010/main" w="9525">
+              <a14:hiddenLine xmlns:a14="http://schemas.microsoft.com/office/drawing/2010/main" xmlns="" w="9525">
                 <a:solidFill>
                   <a:srgbClr val="000000"/>
                 </a:solidFill>
@@ -10775,7 +10784,7 @@
           </a:ln>
           <a:extLst>
             <a:ext uri="{91240B29-F687-4f45-9708-019B960494DF}">
-              <a14:hiddenLine xmlns="" xmlns:a14="http://schemas.microsoft.com/office/drawing/2010/main" w="9525">
+              <a14:hiddenLine xmlns:a14="http://schemas.microsoft.com/office/drawing/2010/main" xmlns="" w="9525">
                 <a:solidFill>
                   <a:srgbClr val="000000"/>
                 </a:solidFill>
@@ -10894,7 +10903,7 @@
           </a:ln>
           <a:extLst>
             <a:ext uri="{91240B29-F687-4f45-9708-019B960494DF}">
-              <a14:hiddenLine xmlns="" xmlns:a14="http://schemas.microsoft.com/office/drawing/2010/main" w="9525">
+              <a14:hiddenLine xmlns:a14="http://schemas.microsoft.com/office/drawing/2010/main" xmlns="" w="9525">
                 <a:solidFill>
                   <a:srgbClr val="000000"/>
                 </a:solidFill>
@@ -10988,7 +10997,7 @@
           </a:ln>
           <a:extLst>
             <a:ext uri="{91240B29-F687-4f45-9708-019B960494DF}">
-              <a14:hiddenLine xmlns="" xmlns:a14="http://schemas.microsoft.com/office/drawing/2010/main" w="9525">
+              <a14:hiddenLine xmlns:a14="http://schemas.microsoft.com/office/drawing/2010/main" xmlns="" w="9525">
                 <a:solidFill>
                   <a:srgbClr val="000000"/>
                 </a:solidFill>
@@ -11060,7 +11069,7 @@
           </a:ln>
           <a:extLst>
             <a:ext uri="{91240B29-F687-4f45-9708-019B960494DF}">
-              <a14:hiddenLine xmlns="" xmlns:a14="http://schemas.microsoft.com/office/drawing/2010/main" w="9525">
+              <a14:hiddenLine xmlns:a14="http://schemas.microsoft.com/office/drawing/2010/main" xmlns="" w="9525">
                 <a:solidFill>
                   <a:srgbClr val="000000"/>
                 </a:solidFill>
@@ -11136,7 +11145,7 @@
           <a:p>
             <a:fld id="{9165E63A-FD65-4B10-BBF8-4169C1054D5D}" type="datetimeFigureOut">
               <a:rPr lang="de-DE" smtClean="0"/>
-              <a:t>26.10.2023</a:t>
+              <a:t>28.10.2023</a:t>
             </a:fld>
             <a:endParaRPr lang="de-DE"/>
           </a:p>
@@ -11837,6 +11846,1793 @@
 </p:sld>
 </file>
 
+<file path=ppt/slides/slide100.xml><?xml version="1.0" encoding="utf-8"?>
+<p:sld xmlns:a="http://schemas.openxmlformats.org/drawingml/2006/main" xmlns:r="http://schemas.openxmlformats.org/officeDocument/2006/relationships" xmlns:p="http://schemas.openxmlformats.org/presentationml/2006/main">
+  <p:cSld>
+    <p:spTree>
+      <p:nvGrpSpPr>
+        <p:cNvPr id="1" name=""/>
+        <p:cNvGrpSpPr/>
+        <p:nvPr/>
+      </p:nvGrpSpPr>
+      <p:grpSpPr>
+        <a:xfrm>
+          <a:off x="0" y="0"/>
+          <a:ext cx="0" cy="0"/>
+          <a:chOff x="0" y="0"/>
+          <a:chExt cx="0" cy="0"/>
+        </a:xfrm>
+      </p:grpSpPr>
+      <p:sp>
+        <p:nvSpPr>
+          <p:cNvPr id="2" name="Titel 1">
+            <a:extLst>
+              <a:ext uri="{FF2B5EF4-FFF2-40B4-BE49-F238E27FC236}">
+                <a16:creationId xmlns:a16="http://schemas.microsoft.com/office/drawing/2014/main" id="{A2422126-BAFC-DB90-D5A7-9994DF5CC9A1}"/>
+              </a:ext>
+            </a:extLst>
+          </p:cNvPr>
+          <p:cNvSpPr>
+            <a:spLocks noGrp="1"/>
+          </p:cNvSpPr>
+          <p:nvPr>
+            <p:ph type="title"/>
+          </p:nvPr>
+        </p:nvSpPr>
+        <p:spPr>
+          <a:xfrm>
+            <a:off x="71437" y="164002"/>
+            <a:ext cx="6824663" cy="739285"/>
+          </a:xfrm>
+        </p:spPr>
+        <p:txBody>
+          <a:bodyPr>
+            <a:normAutofit/>
+          </a:bodyPr>
+          <a:lstStyle/>
+          <a:p>
+            <a:r>
+              <a:rPr lang="de-DE" dirty="0"/>
+              <a:t>Rekursion</a:t>
+            </a:r>
+          </a:p>
+        </p:txBody>
+      </p:sp>
+      <p:sp>
+        <p:nvSpPr>
+          <p:cNvPr id="3" name="Textfeld 2">
+            <a:extLst>
+              <a:ext uri="{FF2B5EF4-FFF2-40B4-BE49-F238E27FC236}">
+                <a16:creationId xmlns:a16="http://schemas.microsoft.com/office/drawing/2014/main" id="{99384273-E90C-0402-DCA7-4BB4965DAB86}"/>
+              </a:ext>
+            </a:extLst>
+          </p:cNvPr>
+          <p:cNvSpPr txBox="1"/>
+          <p:nvPr/>
+        </p:nvSpPr>
+        <p:spPr>
+          <a:xfrm>
+            <a:off x="3158048" y="920621"/>
+            <a:ext cx="5875904" cy="5016758"/>
+          </a:xfrm>
+          <a:prstGeom prst="rect">
+            <a:avLst/>
+          </a:prstGeom>
+          <a:noFill/>
+        </p:spPr>
+        <p:txBody>
+          <a:bodyPr wrap="square" rtlCol="0">
+            <a:spAutoFit/>
+          </a:bodyPr>
+          <a:lstStyle/>
+          <a:p>
+            <a:r>
+              <a:rPr lang="de-DE" sz="4000" dirty="0" err="1">
+                <a:solidFill>
+                  <a:srgbClr val="7F7F7F"/>
+                </a:solidFill>
+              </a:rPr>
+              <a:t>public</a:t>
+            </a:r>
+            <a:r>
+              <a:rPr lang="de-DE" sz="4000" dirty="0">
+                <a:solidFill>
+                  <a:srgbClr val="7F7F7F"/>
+                </a:solidFill>
+              </a:rPr>
+              <a:t> </a:t>
+            </a:r>
+            <a:r>
+              <a:rPr lang="de-DE" sz="4000" dirty="0" err="1">
+                <a:solidFill>
+                  <a:srgbClr val="7F7F7F"/>
+                </a:solidFill>
+              </a:rPr>
+              <a:t>void</a:t>
+            </a:r>
+            <a:r>
+              <a:rPr lang="de-DE" sz="4000" dirty="0">
+                <a:solidFill>
+                  <a:srgbClr val="7F7F7F"/>
+                </a:solidFill>
+              </a:rPr>
+              <a:t> </a:t>
+            </a:r>
+            <a:r>
+              <a:rPr lang="de-DE" sz="4000" dirty="0" err="1">
+                <a:solidFill>
+                  <a:srgbClr val="FFFF00"/>
+                </a:solidFill>
+              </a:rPr>
+              <a:t>countRec</a:t>
+            </a:r>
+            <a:r>
+              <a:rPr lang="de-DE" sz="4000" dirty="0"/>
+              <a:t>(</a:t>
+            </a:r>
+            <a:r>
+              <a:rPr lang="de-DE" sz="4000" dirty="0" err="1">
+                <a:solidFill>
+                  <a:schemeClr val="bg2">
+                    <a:lumMod val="60000"/>
+                    <a:lumOff val="40000"/>
+                  </a:schemeClr>
+                </a:solidFill>
+              </a:rPr>
+              <a:t>int</a:t>
+            </a:r>
+            <a:r>
+              <a:rPr lang="de-DE" sz="4000" dirty="0"/>
+              <a:t> </a:t>
+            </a:r>
+            <a:r>
+              <a:rPr lang="de-DE" sz="4000" dirty="0">
+                <a:solidFill>
+                  <a:srgbClr val="FFFF00"/>
+                </a:solidFill>
+              </a:rPr>
+              <a:t>i</a:t>
+            </a:r>
+            <a:r>
+              <a:rPr lang="de-DE" sz="4000" dirty="0"/>
+              <a:t>)</a:t>
+            </a:r>
+            <a:r>
+              <a:rPr lang="de-DE" sz="4000" dirty="0">
+                <a:solidFill>
+                  <a:srgbClr val="7F7F7F"/>
+                </a:solidFill>
+              </a:rPr>
+              <a:t>{</a:t>
+            </a:r>
+          </a:p>
+          <a:p>
+            <a:r>
+              <a:rPr lang="de-DE" sz="4000" dirty="0">
+                <a:solidFill>
+                  <a:srgbClr val="7F7F7F"/>
+                </a:solidFill>
+              </a:rPr>
+              <a:t>	</a:t>
+            </a:r>
+            <a:r>
+              <a:rPr lang="de-DE" sz="4000" dirty="0" err="1">
+                <a:solidFill>
+                  <a:srgbClr val="7F7F7F"/>
+                </a:solidFill>
+              </a:rPr>
+              <a:t>if</a:t>
+            </a:r>
+            <a:r>
+              <a:rPr lang="de-DE" sz="4000" dirty="0">
+                <a:solidFill>
+                  <a:srgbClr val="7F7F7F"/>
+                </a:solidFill>
+              </a:rPr>
+              <a:t>(i == 0){</a:t>
+            </a:r>
+          </a:p>
+          <a:p>
+            <a:r>
+              <a:rPr lang="de-DE" sz="4000" dirty="0">
+                <a:solidFill>
+                  <a:srgbClr val="7F7F7F"/>
+                </a:solidFill>
+              </a:rPr>
+              <a:t>		</a:t>
+            </a:r>
+            <a:r>
+              <a:rPr lang="de-DE" sz="4000" dirty="0" err="1">
+                <a:solidFill>
+                  <a:srgbClr val="7F7F7F"/>
+                </a:solidFill>
+              </a:rPr>
+              <a:t>System.out.println</a:t>
+            </a:r>
+            <a:r>
+              <a:rPr lang="de-DE" sz="4000" dirty="0">
+                <a:solidFill>
+                  <a:srgbClr val="7F7F7F"/>
+                </a:solidFill>
+              </a:rPr>
+              <a:t>(„0“);</a:t>
+            </a:r>
+          </a:p>
+          <a:p>
+            <a:r>
+              <a:rPr lang="de-DE" sz="4000" dirty="0">
+                <a:solidFill>
+                  <a:srgbClr val="7F7F7F"/>
+                </a:solidFill>
+              </a:rPr>
+              <a:t>		</a:t>
+            </a:r>
+            <a:r>
+              <a:rPr lang="de-DE" sz="4000" dirty="0" err="1">
+                <a:solidFill>
+                  <a:srgbClr val="7F7F7F"/>
+                </a:solidFill>
+              </a:rPr>
+              <a:t>return</a:t>
+            </a:r>
+            <a:r>
+              <a:rPr lang="de-DE" sz="4000" dirty="0">
+                <a:solidFill>
+                  <a:srgbClr val="7F7F7F"/>
+                </a:solidFill>
+              </a:rPr>
+              <a:t>;</a:t>
+            </a:r>
+          </a:p>
+          <a:p>
+            <a:r>
+              <a:rPr lang="de-DE" sz="4000" dirty="0">
+                <a:solidFill>
+                  <a:srgbClr val="7F7F7F"/>
+                </a:solidFill>
+              </a:rPr>
+              <a:t>	}</a:t>
+            </a:r>
+          </a:p>
+          <a:p>
+            <a:r>
+              <a:rPr lang="de-DE" sz="4000" dirty="0">
+                <a:solidFill>
+                  <a:srgbClr val="7F7F7F"/>
+                </a:solidFill>
+              </a:rPr>
+              <a:t>	</a:t>
+            </a:r>
+            <a:r>
+              <a:rPr lang="de-DE" sz="4000" dirty="0" err="1">
+                <a:solidFill>
+                  <a:srgbClr val="7F7F7F"/>
+                </a:solidFill>
+              </a:rPr>
+              <a:t>System.out.println</a:t>
+            </a:r>
+            <a:r>
+              <a:rPr lang="de-DE" sz="4000" dirty="0">
+                <a:solidFill>
+                  <a:srgbClr val="7F7F7F"/>
+                </a:solidFill>
+              </a:rPr>
+              <a:t>(i);</a:t>
+            </a:r>
+          </a:p>
+          <a:p>
+            <a:r>
+              <a:rPr lang="de-DE" sz="4000" dirty="0"/>
+              <a:t>	</a:t>
+            </a:r>
+            <a:r>
+              <a:rPr lang="de-DE" sz="4000" dirty="0">
+                <a:solidFill>
+                  <a:srgbClr val="FFFF00"/>
+                </a:solidFill>
+              </a:rPr>
+              <a:t> </a:t>
+            </a:r>
+            <a:r>
+              <a:rPr lang="de-DE" sz="4000" dirty="0" err="1">
+                <a:solidFill>
+                  <a:srgbClr val="FFFF00"/>
+                </a:solidFill>
+              </a:rPr>
+              <a:t>countRec</a:t>
+            </a:r>
+            <a:r>
+              <a:rPr lang="de-DE" sz="4000" dirty="0"/>
+              <a:t>(</a:t>
+            </a:r>
+            <a:r>
+              <a:rPr lang="de-DE" sz="4000" dirty="0">
+                <a:solidFill>
+                  <a:srgbClr val="FFFF00"/>
+                </a:solidFill>
+              </a:rPr>
+              <a:t>i</a:t>
+            </a:r>
+            <a:r>
+              <a:rPr lang="de-DE" sz="4000" dirty="0"/>
+              <a:t>-</a:t>
+            </a:r>
+            <a:r>
+              <a:rPr lang="de-DE" sz="4000" dirty="0">
+                <a:solidFill>
+                  <a:schemeClr val="accent6">
+                    <a:lumMod val="40000"/>
+                    <a:lumOff val="60000"/>
+                  </a:schemeClr>
+                </a:solidFill>
+              </a:rPr>
+              <a:t>1</a:t>
+            </a:r>
+            <a:r>
+              <a:rPr lang="de-DE" sz="4000" dirty="0"/>
+              <a:t>);</a:t>
+            </a:r>
+          </a:p>
+          <a:p>
+            <a:r>
+              <a:rPr lang="de-DE" sz="4000" dirty="0">
+                <a:solidFill>
+                  <a:srgbClr val="7F7F7F"/>
+                </a:solidFill>
+              </a:rPr>
+              <a:t>}</a:t>
+            </a:r>
+          </a:p>
+        </p:txBody>
+      </p:sp>
+      <p:sp>
+        <p:nvSpPr>
+          <p:cNvPr id="4" name="Textfeld 3">
+            <a:extLst>
+              <a:ext uri="{FF2B5EF4-FFF2-40B4-BE49-F238E27FC236}">
+                <a16:creationId xmlns:a16="http://schemas.microsoft.com/office/drawing/2014/main" id="{11D6829D-1F55-892A-0F97-0D1AEFCE85A9}"/>
+              </a:ext>
+            </a:extLst>
+          </p:cNvPr>
+          <p:cNvSpPr txBox="1"/>
+          <p:nvPr/>
+        </p:nvSpPr>
+        <p:spPr>
+          <a:xfrm>
+            <a:off x="8396388" y="4366226"/>
+            <a:ext cx="2945528" cy="1200329"/>
+          </a:xfrm>
+          <a:prstGeom prst="rect">
+            <a:avLst/>
+          </a:prstGeom>
+          <a:noFill/>
+        </p:spPr>
+        <p:txBody>
+          <a:bodyPr wrap="square" rtlCol="0">
+            <a:spAutoFit/>
+          </a:bodyPr>
+          <a:lstStyle/>
+          <a:p>
+            <a:r>
+              <a:rPr lang="de-DE" dirty="0"/>
+              <a:t>Der Rekursionsaufruf. In diesem Fall wird der Parameter mit jedem Aufruf um 1 verringert </a:t>
+            </a:r>
+          </a:p>
+        </p:txBody>
+      </p:sp>
+      <p:cxnSp>
+        <p:nvCxnSpPr>
+          <p:cNvPr id="6" name="Gerade Verbindung mit Pfeil 5">
+            <a:extLst>
+              <a:ext uri="{FF2B5EF4-FFF2-40B4-BE49-F238E27FC236}">
+                <a16:creationId xmlns:a16="http://schemas.microsoft.com/office/drawing/2014/main" id="{0278BD13-A3A4-FDA1-9767-187D8EBFB995}"/>
+              </a:ext>
+            </a:extLst>
+          </p:cNvPr>
+          <p:cNvCxnSpPr/>
+          <p:nvPr/>
+        </p:nvCxnSpPr>
+        <p:spPr>
+          <a:xfrm flipH="1">
+            <a:off x="7088696" y="4966391"/>
+            <a:ext cx="1048624" cy="0"/>
+          </a:xfrm>
+          <a:prstGeom prst="straightConnector1">
+            <a:avLst/>
+          </a:prstGeom>
+          <a:ln w="57150">
+            <a:tailEnd type="triangle"/>
+          </a:ln>
+        </p:spPr>
+        <p:style>
+          <a:lnRef idx="1">
+            <a:schemeClr val="accent1"/>
+          </a:lnRef>
+          <a:fillRef idx="0">
+            <a:schemeClr val="accent1"/>
+          </a:fillRef>
+          <a:effectRef idx="0">
+            <a:schemeClr val="accent1"/>
+          </a:effectRef>
+          <a:fontRef idx="minor">
+            <a:schemeClr val="tx1"/>
+          </a:fontRef>
+        </p:style>
+      </p:cxnSp>
+    </p:spTree>
+    <p:extLst>
+      <p:ext uri="{BB962C8B-B14F-4D97-AF65-F5344CB8AC3E}">
+        <p14:creationId xmlns:p14="http://schemas.microsoft.com/office/powerpoint/2010/main" val="2194118843"/>
+      </p:ext>
+    </p:extLst>
+  </p:cSld>
+  <p:clrMapOvr>
+    <a:masterClrMapping/>
+  </p:clrMapOvr>
+</p:sld>
+</file>
+
+<file path=ppt/slides/slide101.xml><?xml version="1.0" encoding="utf-8"?>
+<p:sld xmlns:a="http://schemas.openxmlformats.org/drawingml/2006/main" xmlns:r="http://schemas.openxmlformats.org/officeDocument/2006/relationships" xmlns:p="http://schemas.openxmlformats.org/presentationml/2006/main">
+  <p:cSld>
+    <p:spTree>
+      <p:nvGrpSpPr>
+        <p:cNvPr id="1" name=""/>
+        <p:cNvGrpSpPr/>
+        <p:nvPr/>
+      </p:nvGrpSpPr>
+      <p:grpSpPr>
+        <a:xfrm>
+          <a:off x="0" y="0"/>
+          <a:ext cx="0" cy="0"/>
+          <a:chOff x="0" y="0"/>
+          <a:chExt cx="0" cy="0"/>
+        </a:xfrm>
+      </p:grpSpPr>
+      <p:sp>
+        <p:nvSpPr>
+          <p:cNvPr id="2" name="Titel 1">
+            <a:extLst>
+              <a:ext uri="{FF2B5EF4-FFF2-40B4-BE49-F238E27FC236}">
+                <a16:creationId xmlns:a16="http://schemas.microsoft.com/office/drawing/2014/main" id="{A2422126-BAFC-DB90-D5A7-9994DF5CC9A1}"/>
+              </a:ext>
+            </a:extLst>
+          </p:cNvPr>
+          <p:cNvSpPr>
+            <a:spLocks noGrp="1"/>
+          </p:cNvSpPr>
+          <p:nvPr>
+            <p:ph type="title"/>
+          </p:nvPr>
+        </p:nvSpPr>
+        <p:spPr>
+          <a:xfrm>
+            <a:off x="71437" y="164002"/>
+            <a:ext cx="6824663" cy="739285"/>
+          </a:xfrm>
+        </p:spPr>
+        <p:txBody>
+          <a:bodyPr>
+            <a:normAutofit/>
+          </a:bodyPr>
+          <a:lstStyle/>
+          <a:p>
+            <a:r>
+              <a:rPr lang="de-DE" dirty="0"/>
+              <a:t>Rekursion</a:t>
+            </a:r>
+          </a:p>
+        </p:txBody>
+      </p:sp>
+      <p:sp>
+        <p:nvSpPr>
+          <p:cNvPr id="3" name="Textfeld 2">
+            <a:extLst>
+              <a:ext uri="{FF2B5EF4-FFF2-40B4-BE49-F238E27FC236}">
+                <a16:creationId xmlns:a16="http://schemas.microsoft.com/office/drawing/2014/main" id="{99384273-E90C-0402-DCA7-4BB4965DAB86}"/>
+              </a:ext>
+            </a:extLst>
+          </p:cNvPr>
+          <p:cNvSpPr txBox="1"/>
+          <p:nvPr/>
+        </p:nvSpPr>
+        <p:spPr>
+          <a:xfrm>
+            <a:off x="3158048" y="920621"/>
+            <a:ext cx="5875904" cy="5016758"/>
+          </a:xfrm>
+          <a:prstGeom prst="rect">
+            <a:avLst/>
+          </a:prstGeom>
+          <a:noFill/>
+        </p:spPr>
+        <p:txBody>
+          <a:bodyPr wrap="square" rtlCol="0">
+            <a:spAutoFit/>
+          </a:bodyPr>
+          <a:lstStyle/>
+          <a:p>
+            <a:r>
+              <a:rPr lang="de-DE" sz="4000" dirty="0" err="1">
+                <a:solidFill>
+                  <a:srgbClr val="7F7F7F"/>
+                </a:solidFill>
+              </a:rPr>
+              <a:t>public</a:t>
+            </a:r>
+            <a:r>
+              <a:rPr lang="de-DE" sz="4000" dirty="0">
+                <a:solidFill>
+                  <a:srgbClr val="7F7F7F"/>
+                </a:solidFill>
+              </a:rPr>
+              <a:t> </a:t>
+            </a:r>
+            <a:r>
+              <a:rPr lang="de-DE" sz="4000" dirty="0" err="1">
+                <a:solidFill>
+                  <a:srgbClr val="7F7F7F"/>
+                </a:solidFill>
+              </a:rPr>
+              <a:t>void</a:t>
+            </a:r>
+            <a:r>
+              <a:rPr lang="de-DE" sz="4000" dirty="0">
+                <a:solidFill>
+                  <a:srgbClr val="7F7F7F"/>
+                </a:solidFill>
+              </a:rPr>
+              <a:t> </a:t>
+            </a:r>
+            <a:r>
+              <a:rPr lang="de-DE" sz="4000" dirty="0" err="1">
+                <a:solidFill>
+                  <a:srgbClr val="7F7F7F"/>
+                </a:solidFill>
+              </a:rPr>
+              <a:t>countRec</a:t>
+            </a:r>
+            <a:r>
+              <a:rPr lang="de-DE" sz="4000" dirty="0">
+                <a:solidFill>
+                  <a:srgbClr val="7F7F7F"/>
+                </a:solidFill>
+              </a:rPr>
+              <a:t>(</a:t>
+            </a:r>
+            <a:r>
+              <a:rPr lang="de-DE" sz="4000" dirty="0" err="1">
+                <a:solidFill>
+                  <a:srgbClr val="7F7F7F"/>
+                </a:solidFill>
+              </a:rPr>
+              <a:t>int</a:t>
+            </a:r>
+            <a:r>
+              <a:rPr lang="de-DE" sz="4000" dirty="0">
+                <a:solidFill>
+                  <a:srgbClr val="7F7F7F"/>
+                </a:solidFill>
+              </a:rPr>
+              <a:t> i){</a:t>
+            </a:r>
+          </a:p>
+          <a:p>
+            <a:r>
+              <a:rPr lang="de-DE" sz="4000" dirty="0"/>
+              <a:t>	</a:t>
+            </a:r>
+            <a:r>
+              <a:rPr lang="de-DE" sz="4000" dirty="0" err="1">
+                <a:solidFill>
+                  <a:schemeClr val="bg2">
+                    <a:lumMod val="60000"/>
+                    <a:lumOff val="40000"/>
+                  </a:schemeClr>
+                </a:solidFill>
+              </a:rPr>
+              <a:t>if</a:t>
+            </a:r>
+            <a:r>
+              <a:rPr lang="de-DE" sz="4000" dirty="0"/>
+              <a:t>(</a:t>
+            </a:r>
+            <a:r>
+              <a:rPr lang="de-DE" sz="4000" dirty="0">
+                <a:solidFill>
+                  <a:srgbClr val="FFFF00"/>
+                </a:solidFill>
+              </a:rPr>
+              <a:t>i</a:t>
+            </a:r>
+            <a:r>
+              <a:rPr lang="de-DE" sz="4000" dirty="0"/>
+              <a:t> == </a:t>
+            </a:r>
+            <a:r>
+              <a:rPr lang="de-DE" sz="4000" dirty="0">
+                <a:solidFill>
+                  <a:schemeClr val="accent6">
+                    <a:lumMod val="40000"/>
+                    <a:lumOff val="60000"/>
+                  </a:schemeClr>
+                </a:solidFill>
+              </a:rPr>
+              <a:t>0</a:t>
+            </a:r>
+            <a:r>
+              <a:rPr lang="de-DE" sz="4000" dirty="0"/>
+              <a:t>){</a:t>
+            </a:r>
+          </a:p>
+          <a:p>
+            <a:r>
+              <a:rPr lang="de-DE" sz="4000" dirty="0"/>
+              <a:t>		</a:t>
+            </a:r>
+            <a:r>
+              <a:rPr lang="de-DE" sz="4000" dirty="0" err="1"/>
+              <a:t>System.out.println</a:t>
+            </a:r>
+            <a:r>
+              <a:rPr lang="de-DE" sz="4000" dirty="0"/>
+              <a:t>(„0“);</a:t>
+            </a:r>
+          </a:p>
+          <a:p>
+            <a:r>
+              <a:rPr lang="de-DE" sz="4000" dirty="0"/>
+              <a:t>		</a:t>
+            </a:r>
+            <a:r>
+              <a:rPr lang="de-DE" sz="4000" dirty="0" err="1">
+                <a:solidFill>
+                  <a:schemeClr val="bg2">
+                    <a:lumMod val="60000"/>
+                    <a:lumOff val="40000"/>
+                  </a:schemeClr>
+                </a:solidFill>
+              </a:rPr>
+              <a:t>return</a:t>
+            </a:r>
+            <a:r>
+              <a:rPr lang="de-DE" sz="4000" dirty="0"/>
+              <a:t>;</a:t>
+            </a:r>
+          </a:p>
+          <a:p>
+            <a:r>
+              <a:rPr lang="de-DE" sz="4000" dirty="0">
+                <a:solidFill>
+                  <a:srgbClr val="7F7F7F"/>
+                </a:solidFill>
+              </a:rPr>
+              <a:t>	}</a:t>
+            </a:r>
+          </a:p>
+          <a:p>
+            <a:r>
+              <a:rPr lang="de-DE" sz="4000" dirty="0">
+                <a:solidFill>
+                  <a:srgbClr val="7F7F7F"/>
+                </a:solidFill>
+              </a:rPr>
+              <a:t>	</a:t>
+            </a:r>
+            <a:r>
+              <a:rPr lang="de-DE" sz="4000" dirty="0" err="1">
+                <a:solidFill>
+                  <a:srgbClr val="7F7F7F"/>
+                </a:solidFill>
+              </a:rPr>
+              <a:t>System.out.println</a:t>
+            </a:r>
+            <a:r>
+              <a:rPr lang="de-DE" sz="4000" dirty="0">
+                <a:solidFill>
+                  <a:srgbClr val="7F7F7F"/>
+                </a:solidFill>
+              </a:rPr>
+              <a:t>(i);</a:t>
+            </a:r>
+          </a:p>
+          <a:p>
+            <a:r>
+              <a:rPr lang="de-DE" sz="4000" dirty="0">
+                <a:solidFill>
+                  <a:srgbClr val="7F7F7F"/>
+                </a:solidFill>
+              </a:rPr>
+              <a:t>	 </a:t>
+            </a:r>
+            <a:r>
+              <a:rPr lang="de-DE" sz="4000" dirty="0" err="1">
+                <a:solidFill>
+                  <a:srgbClr val="7F7F7F"/>
+                </a:solidFill>
+              </a:rPr>
+              <a:t>countRec</a:t>
+            </a:r>
+            <a:r>
+              <a:rPr lang="de-DE" sz="4000" dirty="0">
+                <a:solidFill>
+                  <a:srgbClr val="7F7F7F"/>
+                </a:solidFill>
+              </a:rPr>
+              <a:t>(i-1);</a:t>
+            </a:r>
+          </a:p>
+          <a:p>
+            <a:r>
+              <a:rPr lang="de-DE" sz="4000" dirty="0">
+                <a:solidFill>
+                  <a:srgbClr val="7F7F7F"/>
+                </a:solidFill>
+              </a:rPr>
+              <a:t>}</a:t>
+            </a:r>
+          </a:p>
+        </p:txBody>
+      </p:sp>
+    </p:spTree>
+    <p:extLst>
+      <p:ext uri="{BB962C8B-B14F-4D97-AF65-F5344CB8AC3E}">
+        <p14:creationId xmlns:p14="http://schemas.microsoft.com/office/powerpoint/2010/main" val="2057031787"/>
+      </p:ext>
+    </p:extLst>
+  </p:cSld>
+  <p:clrMapOvr>
+    <a:masterClrMapping/>
+  </p:clrMapOvr>
+</p:sld>
+</file>
+
+<file path=ppt/slides/slide102.xml><?xml version="1.0" encoding="utf-8"?>
+<p:sld xmlns:a="http://schemas.openxmlformats.org/drawingml/2006/main" xmlns:r="http://schemas.openxmlformats.org/officeDocument/2006/relationships" xmlns:p="http://schemas.openxmlformats.org/presentationml/2006/main">
+  <p:cSld>
+    <p:spTree>
+      <p:nvGrpSpPr>
+        <p:cNvPr id="1" name=""/>
+        <p:cNvGrpSpPr/>
+        <p:nvPr/>
+      </p:nvGrpSpPr>
+      <p:grpSpPr>
+        <a:xfrm>
+          <a:off x="0" y="0"/>
+          <a:ext cx="0" cy="0"/>
+          <a:chOff x="0" y="0"/>
+          <a:chExt cx="0" cy="0"/>
+        </a:xfrm>
+      </p:grpSpPr>
+      <p:sp>
+        <p:nvSpPr>
+          <p:cNvPr id="2" name="Titel 1">
+            <a:extLst>
+              <a:ext uri="{FF2B5EF4-FFF2-40B4-BE49-F238E27FC236}">
+                <a16:creationId xmlns:a16="http://schemas.microsoft.com/office/drawing/2014/main" id="{A2422126-BAFC-DB90-D5A7-9994DF5CC9A1}"/>
+              </a:ext>
+            </a:extLst>
+          </p:cNvPr>
+          <p:cNvSpPr>
+            <a:spLocks noGrp="1"/>
+          </p:cNvSpPr>
+          <p:nvPr>
+            <p:ph type="title"/>
+          </p:nvPr>
+        </p:nvSpPr>
+        <p:spPr>
+          <a:xfrm>
+            <a:off x="71437" y="164002"/>
+            <a:ext cx="6824663" cy="739285"/>
+          </a:xfrm>
+        </p:spPr>
+        <p:txBody>
+          <a:bodyPr>
+            <a:normAutofit/>
+          </a:bodyPr>
+          <a:lstStyle/>
+          <a:p>
+            <a:r>
+              <a:rPr lang="de-DE" dirty="0"/>
+              <a:t>Rekursion</a:t>
+            </a:r>
+          </a:p>
+        </p:txBody>
+      </p:sp>
+      <p:sp>
+        <p:nvSpPr>
+          <p:cNvPr id="3" name="Textfeld 2">
+            <a:extLst>
+              <a:ext uri="{FF2B5EF4-FFF2-40B4-BE49-F238E27FC236}">
+                <a16:creationId xmlns:a16="http://schemas.microsoft.com/office/drawing/2014/main" id="{99384273-E90C-0402-DCA7-4BB4965DAB86}"/>
+              </a:ext>
+            </a:extLst>
+          </p:cNvPr>
+          <p:cNvSpPr txBox="1"/>
+          <p:nvPr/>
+        </p:nvSpPr>
+        <p:spPr>
+          <a:xfrm>
+            <a:off x="3158048" y="920621"/>
+            <a:ext cx="5875904" cy="5016758"/>
+          </a:xfrm>
+          <a:prstGeom prst="rect">
+            <a:avLst/>
+          </a:prstGeom>
+          <a:noFill/>
+        </p:spPr>
+        <p:txBody>
+          <a:bodyPr wrap="square" rtlCol="0">
+            <a:spAutoFit/>
+          </a:bodyPr>
+          <a:lstStyle/>
+          <a:p>
+            <a:r>
+              <a:rPr lang="de-DE" sz="4000" dirty="0" err="1">
+                <a:solidFill>
+                  <a:srgbClr val="7F7F7F"/>
+                </a:solidFill>
+              </a:rPr>
+              <a:t>public</a:t>
+            </a:r>
+            <a:r>
+              <a:rPr lang="de-DE" sz="4000" dirty="0">
+                <a:solidFill>
+                  <a:srgbClr val="7F7F7F"/>
+                </a:solidFill>
+              </a:rPr>
+              <a:t> </a:t>
+            </a:r>
+            <a:r>
+              <a:rPr lang="de-DE" sz="4000" dirty="0" err="1">
+                <a:solidFill>
+                  <a:srgbClr val="7F7F7F"/>
+                </a:solidFill>
+              </a:rPr>
+              <a:t>void</a:t>
+            </a:r>
+            <a:r>
+              <a:rPr lang="de-DE" sz="4000" dirty="0">
+                <a:solidFill>
+                  <a:srgbClr val="7F7F7F"/>
+                </a:solidFill>
+              </a:rPr>
+              <a:t> </a:t>
+            </a:r>
+            <a:r>
+              <a:rPr lang="de-DE" sz="4000" dirty="0" err="1">
+                <a:solidFill>
+                  <a:srgbClr val="7F7F7F"/>
+                </a:solidFill>
+              </a:rPr>
+              <a:t>countRec</a:t>
+            </a:r>
+            <a:r>
+              <a:rPr lang="de-DE" sz="4000" dirty="0">
+                <a:solidFill>
+                  <a:srgbClr val="7F7F7F"/>
+                </a:solidFill>
+              </a:rPr>
+              <a:t>(</a:t>
+            </a:r>
+            <a:r>
+              <a:rPr lang="de-DE" sz="4000" dirty="0" err="1">
+                <a:solidFill>
+                  <a:srgbClr val="7F7F7F"/>
+                </a:solidFill>
+              </a:rPr>
+              <a:t>int</a:t>
+            </a:r>
+            <a:r>
+              <a:rPr lang="de-DE" sz="4000" dirty="0">
+                <a:solidFill>
+                  <a:srgbClr val="7F7F7F"/>
+                </a:solidFill>
+              </a:rPr>
+              <a:t> i){</a:t>
+            </a:r>
+          </a:p>
+          <a:p>
+            <a:r>
+              <a:rPr lang="de-DE" sz="4000" dirty="0"/>
+              <a:t>	</a:t>
+            </a:r>
+            <a:r>
+              <a:rPr lang="de-DE" sz="4000" dirty="0" err="1">
+                <a:solidFill>
+                  <a:schemeClr val="bg2">
+                    <a:lumMod val="60000"/>
+                    <a:lumOff val="40000"/>
+                  </a:schemeClr>
+                </a:solidFill>
+              </a:rPr>
+              <a:t>if</a:t>
+            </a:r>
+            <a:r>
+              <a:rPr lang="de-DE" sz="4000" dirty="0"/>
+              <a:t>(</a:t>
+            </a:r>
+            <a:r>
+              <a:rPr lang="de-DE" sz="4000" dirty="0">
+                <a:solidFill>
+                  <a:srgbClr val="FFFF00"/>
+                </a:solidFill>
+              </a:rPr>
+              <a:t>i</a:t>
+            </a:r>
+            <a:r>
+              <a:rPr lang="de-DE" sz="4000" dirty="0"/>
+              <a:t> == </a:t>
+            </a:r>
+            <a:r>
+              <a:rPr lang="de-DE" sz="4000" dirty="0">
+                <a:solidFill>
+                  <a:schemeClr val="accent6">
+                    <a:lumMod val="40000"/>
+                    <a:lumOff val="60000"/>
+                  </a:schemeClr>
+                </a:solidFill>
+              </a:rPr>
+              <a:t>0</a:t>
+            </a:r>
+            <a:r>
+              <a:rPr lang="de-DE" sz="4000" dirty="0"/>
+              <a:t>){</a:t>
+            </a:r>
+          </a:p>
+          <a:p>
+            <a:r>
+              <a:rPr lang="de-DE" sz="4000" dirty="0"/>
+              <a:t>		</a:t>
+            </a:r>
+            <a:r>
+              <a:rPr lang="de-DE" sz="4000" dirty="0" err="1"/>
+              <a:t>System.out.println</a:t>
+            </a:r>
+            <a:r>
+              <a:rPr lang="de-DE" sz="4000" dirty="0"/>
+              <a:t>(„0“);</a:t>
+            </a:r>
+          </a:p>
+          <a:p>
+            <a:r>
+              <a:rPr lang="de-DE" sz="4000" dirty="0"/>
+              <a:t>		</a:t>
+            </a:r>
+            <a:r>
+              <a:rPr lang="de-DE" sz="4000" dirty="0" err="1">
+                <a:solidFill>
+                  <a:schemeClr val="bg2">
+                    <a:lumMod val="60000"/>
+                    <a:lumOff val="40000"/>
+                  </a:schemeClr>
+                </a:solidFill>
+              </a:rPr>
+              <a:t>return</a:t>
+            </a:r>
+            <a:r>
+              <a:rPr lang="de-DE" sz="4000" dirty="0"/>
+              <a:t>;</a:t>
+            </a:r>
+          </a:p>
+          <a:p>
+            <a:r>
+              <a:rPr lang="de-DE" sz="4000" dirty="0">
+                <a:solidFill>
+                  <a:srgbClr val="7F7F7F"/>
+                </a:solidFill>
+              </a:rPr>
+              <a:t>	}</a:t>
+            </a:r>
+          </a:p>
+          <a:p>
+            <a:r>
+              <a:rPr lang="de-DE" sz="4000" dirty="0">
+                <a:solidFill>
+                  <a:srgbClr val="7F7F7F"/>
+                </a:solidFill>
+              </a:rPr>
+              <a:t>	</a:t>
+            </a:r>
+            <a:r>
+              <a:rPr lang="de-DE" sz="4000" dirty="0" err="1">
+                <a:solidFill>
+                  <a:srgbClr val="7F7F7F"/>
+                </a:solidFill>
+              </a:rPr>
+              <a:t>System.out.println</a:t>
+            </a:r>
+            <a:r>
+              <a:rPr lang="de-DE" sz="4000" dirty="0">
+                <a:solidFill>
+                  <a:srgbClr val="7F7F7F"/>
+                </a:solidFill>
+              </a:rPr>
+              <a:t>(i);</a:t>
+            </a:r>
+          </a:p>
+          <a:p>
+            <a:r>
+              <a:rPr lang="de-DE" sz="4000" dirty="0">
+                <a:solidFill>
+                  <a:srgbClr val="7F7F7F"/>
+                </a:solidFill>
+              </a:rPr>
+              <a:t>	 </a:t>
+            </a:r>
+            <a:r>
+              <a:rPr lang="de-DE" sz="4000" dirty="0" err="1">
+                <a:solidFill>
+                  <a:srgbClr val="7F7F7F"/>
+                </a:solidFill>
+              </a:rPr>
+              <a:t>countRec</a:t>
+            </a:r>
+            <a:r>
+              <a:rPr lang="de-DE" sz="4000" dirty="0">
+                <a:solidFill>
+                  <a:srgbClr val="7F7F7F"/>
+                </a:solidFill>
+              </a:rPr>
+              <a:t>(i-1);</a:t>
+            </a:r>
+          </a:p>
+          <a:p>
+            <a:r>
+              <a:rPr lang="de-DE" sz="4000" dirty="0">
+                <a:solidFill>
+                  <a:srgbClr val="7F7F7F"/>
+                </a:solidFill>
+              </a:rPr>
+              <a:t>}</a:t>
+            </a:r>
+          </a:p>
+        </p:txBody>
+      </p:sp>
+      <p:sp>
+        <p:nvSpPr>
+          <p:cNvPr id="4" name="Textfeld 3">
+            <a:extLst>
+              <a:ext uri="{FF2B5EF4-FFF2-40B4-BE49-F238E27FC236}">
+                <a16:creationId xmlns:a16="http://schemas.microsoft.com/office/drawing/2014/main" id="{D7790521-FCEE-9971-7898-7DB336D6CD3A}"/>
+              </a:ext>
+            </a:extLst>
+          </p:cNvPr>
+          <p:cNvSpPr txBox="1"/>
+          <p:nvPr/>
+        </p:nvSpPr>
+        <p:spPr>
+          <a:xfrm>
+            <a:off x="71437" y="2045721"/>
+            <a:ext cx="2945528" cy="1477328"/>
+          </a:xfrm>
+          <a:prstGeom prst="rect">
+            <a:avLst/>
+          </a:prstGeom>
+          <a:noFill/>
+        </p:spPr>
+        <p:txBody>
+          <a:bodyPr wrap="square" rtlCol="0">
+            <a:spAutoFit/>
+          </a:bodyPr>
+          <a:lstStyle/>
+          <a:p>
+            <a:r>
+              <a:rPr lang="de-DE" dirty="0"/>
+              <a:t>Die Abbruchbedingung, damit wir in keine Endlosschleife geraten. Wenn </a:t>
+            </a:r>
+            <a:r>
+              <a:rPr lang="de-DE" dirty="0">
+                <a:solidFill>
+                  <a:srgbClr val="FFFF00"/>
+                </a:solidFill>
+              </a:rPr>
+              <a:t>i</a:t>
+            </a:r>
+            <a:r>
+              <a:rPr lang="de-DE" dirty="0"/>
+              <a:t> = 0, dann drucken wir 0 und beenden die ganze Methode (</a:t>
+            </a:r>
+            <a:r>
+              <a:rPr lang="de-DE" dirty="0" err="1">
+                <a:solidFill>
+                  <a:schemeClr val="bg2">
+                    <a:lumMod val="60000"/>
+                    <a:lumOff val="40000"/>
+                  </a:schemeClr>
+                </a:solidFill>
+              </a:rPr>
+              <a:t>return</a:t>
+            </a:r>
+            <a:r>
+              <a:rPr lang="de-DE" dirty="0"/>
+              <a:t>)</a:t>
+            </a:r>
+          </a:p>
+        </p:txBody>
+      </p:sp>
+      <p:cxnSp>
+        <p:nvCxnSpPr>
+          <p:cNvPr id="5" name="Gerade Verbindung mit Pfeil 4">
+            <a:extLst>
+              <a:ext uri="{FF2B5EF4-FFF2-40B4-BE49-F238E27FC236}">
+                <a16:creationId xmlns:a16="http://schemas.microsoft.com/office/drawing/2014/main" id="{E1C97BB5-FFA7-7EBB-0208-F7EDB51B35FC}"/>
+              </a:ext>
+            </a:extLst>
+          </p:cNvPr>
+          <p:cNvCxnSpPr>
+            <a:cxnSpLocks/>
+          </p:cNvCxnSpPr>
+          <p:nvPr/>
+        </p:nvCxnSpPr>
+        <p:spPr>
+          <a:xfrm>
+            <a:off x="2767959" y="2510054"/>
+            <a:ext cx="780177" cy="0"/>
+          </a:xfrm>
+          <a:prstGeom prst="straightConnector1">
+            <a:avLst/>
+          </a:prstGeom>
+          <a:ln w="57150">
+            <a:tailEnd type="triangle"/>
+          </a:ln>
+        </p:spPr>
+        <p:style>
+          <a:lnRef idx="1">
+            <a:schemeClr val="accent1"/>
+          </a:lnRef>
+          <a:fillRef idx="0">
+            <a:schemeClr val="accent1"/>
+          </a:fillRef>
+          <a:effectRef idx="0">
+            <a:schemeClr val="accent1"/>
+          </a:effectRef>
+          <a:fontRef idx="minor">
+            <a:schemeClr val="tx1"/>
+          </a:fontRef>
+        </p:style>
+      </p:cxnSp>
+    </p:spTree>
+    <p:extLst>
+      <p:ext uri="{BB962C8B-B14F-4D97-AF65-F5344CB8AC3E}">
+        <p14:creationId xmlns:p14="http://schemas.microsoft.com/office/powerpoint/2010/main" val="2959570733"/>
+      </p:ext>
+    </p:extLst>
+  </p:cSld>
+  <p:clrMapOvr>
+    <a:masterClrMapping/>
+  </p:clrMapOvr>
+</p:sld>
+</file>
+
+<file path=ppt/slides/slide103.xml><?xml version="1.0" encoding="utf-8"?>
+<p:sld xmlns:a="http://schemas.openxmlformats.org/drawingml/2006/main" xmlns:r="http://schemas.openxmlformats.org/officeDocument/2006/relationships" xmlns:p="http://schemas.openxmlformats.org/presentationml/2006/main">
+  <p:cSld>
+    <p:spTree>
+      <p:nvGrpSpPr>
+        <p:cNvPr id="1" name=""/>
+        <p:cNvGrpSpPr/>
+        <p:nvPr/>
+      </p:nvGrpSpPr>
+      <p:grpSpPr>
+        <a:xfrm>
+          <a:off x="0" y="0"/>
+          <a:ext cx="0" cy="0"/>
+          <a:chOff x="0" y="0"/>
+          <a:chExt cx="0" cy="0"/>
+        </a:xfrm>
+      </p:grpSpPr>
+      <p:sp>
+        <p:nvSpPr>
+          <p:cNvPr id="2" name="Titel 1">
+            <a:extLst>
+              <a:ext uri="{FF2B5EF4-FFF2-40B4-BE49-F238E27FC236}">
+                <a16:creationId xmlns:a16="http://schemas.microsoft.com/office/drawing/2014/main" id="{A2422126-BAFC-DB90-D5A7-9994DF5CC9A1}"/>
+              </a:ext>
+            </a:extLst>
+          </p:cNvPr>
+          <p:cNvSpPr>
+            <a:spLocks noGrp="1"/>
+          </p:cNvSpPr>
+          <p:nvPr>
+            <p:ph type="title"/>
+          </p:nvPr>
+        </p:nvSpPr>
+        <p:spPr>
+          <a:xfrm>
+            <a:off x="71437" y="164002"/>
+            <a:ext cx="6824663" cy="739285"/>
+          </a:xfrm>
+        </p:spPr>
+        <p:txBody>
+          <a:bodyPr>
+            <a:normAutofit/>
+          </a:bodyPr>
+          <a:lstStyle/>
+          <a:p>
+            <a:r>
+              <a:rPr lang="de-DE" dirty="0"/>
+              <a:t>Rekursion</a:t>
+            </a:r>
+          </a:p>
+        </p:txBody>
+      </p:sp>
+      <p:sp>
+        <p:nvSpPr>
+          <p:cNvPr id="3" name="Textfeld 2">
+            <a:extLst>
+              <a:ext uri="{FF2B5EF4-FFF2-40B4-BE49-F238E27FC236}">
+                <a16:creationId xmlns:a16="http://schemas.microsoft.com/office/drawing/2014/main" id="{99384273-E90C-0402-DCA7-4BB4965DAB86}"/>
+              </a:ext>
+            </a:extLst>
+          </p:cNvPr>
+          <p:cNvSpPr txBox="1"/>
+          <p:nvPr/>
+        </p:nvSpPr>
+        <p:spPr>
+          <a:xfrm>
+            <a:off x="3158048" y="920621"/>
+            <a:ext cx="5875904" cy="5632311"/>
+          </a:xfrm>
+          <a:prstGeom prst="rect">
+            <a:avLst/>
+          </a:prstGeom>
+          <a:noFill/>
+        </p:spPr>
+        <p:txBody>
+          <a:bodyPr wrap="square" rtlCol="0">
+            <a:spAutoFit/>
+          </a:bodyPr>
+          <a:lstStyle/>
+          <a:p>
+            <a:r>
+              <a:rPr lang="de-DE" sz="4000" dirty="0" err="1">
+                <a:solidFill>
+                  <a:schemeClr val="bg2">
+                    <a:lumMod val="60000"/>
+                    <a:lumOff val="40000"/>
+                  </a:schemeClr>
+                </a:solidFill>
+              </a:rPr>
+              <a:t>public</a:t>
+            </a:r>
+            <a:r>
+              <a:rPr lang="de-DE" sz="4000" dirty="0">
+                <a:solidFill>
+                  <a:schemeClr val="bg2">
+                    <a:lumMod val="60000"/>
+                    <a:lumOff val="40000"/>
+                  </a:schemeClr>
+                </a:solidFill>
+              </a:rPr>
+              <a:t> </a:t>
+            </a:r>
+            <a:r>
+              <a:rPr lang="de-DE" sz="4000" dirty="0" err="1">
+                <a:solidFill>
+                  <a:schemeClr val="bg2">
+                    <a:lumMod val="60000"/>
+                    <a:lumOff val="40000"/>
+                  </a:schemeClr>
+                </a:solidFill>
+              </a:rPr>
+              <a:t>void</a:t>
+            </a:r>
+            <a:r>
+              <a:rPr lang="de-DE" sz="4000" dirty="0">
+                <a:solidFill>
+                  <a:schemeClr val="bg2">
+                    <a:lumMod val="60000"/>
+                    <a:lumOff val="40000"/>
+                  </a:schemeClr>
+                </a:solidFill>
+              </a:rPr>
+              <a:t> </a:t>
+            </a:r>
+            <a:r>
+              <a:rPr lang="de-DE" sz="4000" dirty="0" err="1">
+                <a:solidFill>
+                  <a:srgbClr val="FFFF00"/>
+                </a:solidFill>
+              </a:rPr>
+              <a:t>countRec</a:t>
+            </a:r>
+            <a:r>
+              <a:rPr lang="de-DE" sz="4000" dirty="0"/>
+              <a:t>(</a:t>
+            </a:r>
+            <a:r>
+              <a:rPr lang="de-DE" sz="4000" dirty="0" err="1">
+                <a:solidFill>
+                  <a:schemeClr val="bg2">
+                    <a:lumMod val="60000"/>
+                    <a:lumOff val="40000"/>
+                  </a:schemeClr>
+                </a:solidFill>
+              </a:rPr>
+              <a:t>int</a:t>
+            </a:r>
+            <a:r>
+              <a:rPr lang="de-DE" sz="4000" dirty="0"/>
+              <a:t> </a:t>
+            </a:r>
+            <a:r>
+              <a:rPr lang="de-DE" sz="4000" dirty="0">
+                <a:solidFill>
+                  <a:srgbClr val="FFFF00"/>
+                </a:solidFill>
+              </a:rPr>
+              <a:t>i</a:t>
+            </a:r>
+            <a:r>
+              <a:rPr lang="de-DE" sz="4000" dirty="0"/>
+              <a:t>){</a:t>
+            </a:r>
+          </a:p>
+          <a:p>
+            <a:r>
+              <a:rPr lang="de-DE" sz="4000" dirty="0"/>
+              <a:t>	</a:t>
+            </a:r>
+            <a:r>
+              <a:rPr lang="de-DE" sz="4000" dirty="0" err="1">
+                <a:solidFill>
+                  <a:schemeClr val="bg2">
+                    <a:lumMod val="60000"/>
+                    <a:lumOff val="40000"/>
+                  </a:schemeClr>
+                </a:solidFill>
+              </a:rPr>
+              <a:t>if</a:t>
+            </a:r>
+            <a:r>
+              <a:rPr lang="de-DE" sz="4000" dirty="0"/>
+              <a:t>(</a:t>
+            </a:r>
+            <a:r>
+              <a:rPr lang="de-DE" sz="4000" dirty="0">
+                <a:solidFill>
+                  <a:srgbClr val="FFFF00"/>
+                </a:solidFill>
+              </a:rPr>
+              <a:t>i</a:t>
+            </a:r>
+            <a:r>
+              <a:rPr lang="de-DE" sz="4000" dirty="0"/>
+              <a:t> == </a:t>
+            </a:r>
+            <a:r>
+              <a:rPr lang="de-DE" sz="4000" dirty="0">
+                <a:solidFill>
+                  <a:schemeClr val="accent6">
+                    <a:lumMod val="40000"/>
+                    <a:lumOff val="60000"/>
+                  </a:schemeClr>
+                </a:solidFill>
+              </a:rPr>
+              <a:t>0</a:t>
+            </a:r>
+            <a:r>
+              <a:rPr lang="de-DE" sz="4000" dirty="0"/>
+              <a:t>){</a:t>
+            </a:r>
+          </a:p>
+          <a:p>
+            <a:r>
+              <a:rPr lang="de-DE" sz="4000" dirty="0"/>
+              <a:t>		</a:t>
+            </a:r>
+            <a:r>
+              <a:rPr lang="de-DE" sz="4000" dirty="0" err="1"/>
+              <a:t>System.out.println</a:t>
+            </a:r>
+            <a:r>
+              <a:rPr lang="de-DE" sz="4000" dirty="0"/>
+              <a:t>(„0“);</a:t>
+            </a:r>
+          </a:p>
+          <a:p>
+            <a:r>
+              <a:rPr lang="de-DE" sz="4000" dirty="0"/>
+              <a:t>	}</a:t>
+            </a:r>
+          </a:p>
+          <a:p>
+            <a:r>
+              <a:rPr lang="de-DE" sz="4000" dirty="0"/>
+              <a:t>	</a:t>
+            </a:r>
+            <a:r>
+              <a:rPr lang="de-DE" sz="4000" dirty="0" err="1">
+                <a:solidFill>
+                  <a:schemeClr val="bg2">
+                    <a:lumMod val="60000"/>
+                    <a:lumOff val="40000"/>
+                  </a:schemeClr>
+                </a:solidFill>
+              </a:rPr>
+              <a:t>else</a:t>
+            </a:r>
+            <a:r>
+              <a:rPr lang="de-DE" sz="4000" dirty="0"/>
+              <a:t>{</a:t>
+            </a:r>
+          </a:p>
+          <a:p>
+            <a:r>
+              <a:rPr lang="de-DE" sz="4000" dirty="0"/>
+              <a:t>	</a:t>
+            </a:r>
+            <a:r>
+              <a:rPr lang="de-DE" sz="4000" dirty="0" err="1"/>
+              <a:t>System.out.println</a:t>
+            </a:r>
+            <a:r>
+              <a:rPr lang="de-DE" sz="4000" dirty="0"/>
+              <a:t>(</a:t>
+            </a:r>
+            <a:r>
+              <a:rPr lang="de-DE" sz="4000" dirty="0">
+                <a:solidFill>
+                  <a:srgbClr val="FFFF00"/>
+                </a:solidFill>
+              </a:rPr>
+              <a:t>i</a:t>
+            </a:r>
+            <a:r>
+              <a:rPr lang="de-DE" sz="4000" dirty="0"/>
+              <a:t>);</a:t>
+            </a:r>
+          </a:p>
+          <a:p>
+            <a:r>
+              <a:rPr lang="de-DE" sz="4000" dirty="0"/>
+              <a:t>	</a:t>
+            </a:r>
+            <a:r>
+              <a:rPr lang="de-DE" sz="4000" dirty="0">
+                <a:solidFill>
+                  <a:srgbClr val="FFFF00"/>
+                </a:solidFill>
+              </a:rPr>
+              <a:t> </a:t>
+            </a:r>
+            <a:r>
+              <a:rPr lang="de-DE" sz="4000" dirty="0" err="1">
+                <a:solidFill>
+                  <a:srgbClr val="FFFF00"/>
+                </a:solidFill>
+              </a:rPr>
+              <a:t>countRec</a:t>
+            </a:r>
+            <a:r>
+              <a:rPr lang="de-DE" sz="4000" dirty="0"/>
+              <a:t>(</a:t>
+            </a:r>
+            <a:r>
+              <a:rPr lang="de-DE" sz="4000" dirty="0">
+                <a:solidFill>
+                  <a:srgbClr val="FFFF00"/>
+                </a:solidFill>
+              </a:rPr>
+              <a:t>i</a:t>
+            </a:r>
+            <a:r>
+              <a:rPr lang="de-DE" sz="4000" dirty="0"/>
+              <a:t>-1);</a:t>
+            </a:r>
+          </a:p>
+          <a:p>
+            <a:r>
+              <a:rPr lang="de-DE" sz="4000" dirty="0"/>
+              <a:t>	}</a:t>
+            </a:r>
+          </a:p>
+          <a:p>
+            <a:r>
+              <a:rPr lang="de-DE" sz="4000" dirty="0"/>
+              <a:t>}</a:t>
+            </a:r>
+          </a:p>
+        </p:txBody>
+      </p:sp>
+      <p:sp>
+        <p:nvSpPr>
+          <p:cNvPr id="4" name="Textfeld 3">
+            <a:extLst>
+              <a:ext uri="{FF2B5EF4-FFF2-40B4-BE49-F238E27FC236}">
+                <a16:creationId xmlns:a16="http://schemas.microsoft.com/office/drawing/2014/main" id="{CF22399A-24C6-84D8-3595-789736403045}"/>
+              </a:ext>
+            </a:extLst>
+          </p:cNvPr>
+          <p:cNvSpPr txBox="1"/>
+          <p:nvPr/>
+        </p:nvSpPr>
+        <p:spPr>
+          <a:xfrm>
+            <a:off x="947956" y="3053593"/>
+            <a:ext cx="1862356" cy="923330"/>
+          </a:xfrm>
+          <a:prstGeom prst="rect">
+            <a:avLst/>
+          </a:prstGeom>
+          <a:noFill/>
+        </p:spPr>
+        <p:txBody>
+          <a:bodyPr wrap="square" rtlCol="0">
+            <a:spAutoFit/>
+          </a:bodyPr>
+          <a:lstStyle/>
+          <a:p>
+            <a:r>
+              <a:rPr lang="de-DE" dirty="0"/>
+              <a:t>Das geht auch, braucht aber ne Zeile mehr ;)</a:t>
+            </a:r>
+          </a:p>
+        </p:txBody>
+      </p:sp>
+    </p:spTree>
+    <p:extLst>
+      <p:ext uri="{BB962C8B-B14F-4D97-AF65-F5344CB8AC3E}">
+        <p14:creationId xmlns:p14="http://schemas.microsoft.com/office/powerpoint/2010/main" val="3204948420"/>
+      </p:ext>
+    </p:extLst>
+  </p:cSld>
+  <p:clrMapOvr>
+    <a:masterClrMapping/>
+  </p:clrMapOvr>
+</p:sld>
+</file>
+
+<file path=ppt/slides/slide104.xml><?xml version="1.0" encoding="utf-8"?>
+<p:sld xmlns:a="http://schemas.openxmlformats.org/drawingml/2006/main" xmlns:r="http://schemas.openxmlformats.org/officeDocument/2006/relationships" xmlns:p="http://schemas.openxmlformats.org/presentationml/2006/main">
+  <p:cSld>
+    <p:spTree>
+      <p:nvGrpSpPr>
+        <p:cNvPr id="1" name=""/>
+        <p:cNvGrpSpPr/>
+        <p:nvPr/>
+      </p:nvGrpSpPr>
+      <p:grpSpPr>
+        <a:xfrm>
+          <a:off x="0" y="0"/>
+          <a:ext cx="0" cy="0"/>
+          <a:chOff x="0" y="0"/>
+          <a:chExt cx="0" cy="0"/>
+        </a:xfrm>
+      </p:grpSpPr>
+      <p:sp>
+        <p:nvSpPr>
+          <p:cNvPr id="2" name="Titel 1">
+            <a:extLst>
+              <a:ext uri="{FF2B5EF4-FFF2-40B4-BE49-F238E27FC236}">
+                <a16:creationId xmlns:a16="http://schemas.microsoft.com/office/drawing/2014/main" id="{A2422126-BAFC-DB90-D5A7-9994DF5CC9A1}"/>
+              </a:ext>
+            </a:extLst>
+          </p:cNvPr>
+          <p:cNvSpPr>
+            <a:spLocks noGrp="1"/>
+          </p:cNvSpPr>
+          <p:nvPr>
+            <p:ph type="title"/>
+          </p:nvPr>
+        </p:nvSpPr>
+        <p:spPr>
+          <a:xfrm>
+            <a:off x="71437" y="164002"/>
+            <a:ext cx="6824663" cy="739285"/>
+          </a:xfrm>
+        </p:spPr>
+        <p:txBody>
+          <a:bodyPr/>
+          <a:lstStyle/>
+          <a:p>
+            <a:r>
+              <a:rPr lang="de-DE" dirty="0"/>
+              <a:t>Rekursion</a:t>
+            </a:r>
+          </a:p>
+        </p:txBody>
+      </p:sp>
+      <p:pic>
+        <p:nvPicPr>
+          <p:cNvPr id="1026" name="Picture 2">
+            <a:extLst>
+              <a:ext uri="{FF2B5EF4-FFF2-40B4-BE49-F238E27FC236}">
+                <a16:creationId xmlns:a16="http://schemas.microsoft.com/office/drawing/2014/main" id="{9330D00D-07A6-29DD-2D84-59C1D10837F0}"/>
+              </a:ext>
+            </a:extLst>
+          </p:cNvPr>
+          <p:cNvPicPr>
+            <a:picLocks noChangeAspect="1" noChangeArrowheads="1"/>
+          </p:cNvPicPr>
+          <p:nvPr/>
+        </p:nvPicPr>
+        <p:blipFill>
+          <a:blip r:embed="rId2">
+            <a:extLst>
+              <a:ext uri="{28A0092B-C50C-407E-A947-70E740481C1C}">
+                <a14:useLocalDpi xmlns:a14="http://schemas.microsoft.com/office/drawing/2010/main" val="0"/>
+              </a:ext>
+            </a:extLst>
+          </a:blip>
+          <a:srcRect/>
+          <a:stretch>
+            <a:fillRect/>
+          </a:stretch>
+        </p:blipFill>
+        <p:spPr bwMode="auto">
+          <a:xfrm>
+            <a:off x="4229100" y="1562100"/>
+            <a:ext cx="3733800" cy="3733800"/>
+          </a:xfrm>
+          <a:prstGeom prst="rect">
+            <a:avLst/>
+          </a:prstGeom>
+          <a:noFill/>
+          <a:extLst>
+            <a:ext uri="{909E8E84-426E-40DD-AFC4-6F175D3DCCD1}">
+              <a14:hiddenFill xmlns:a14="http://schemas.microsoft.com/office/drawing/2010/main">
+                <a:solidFill>
+                  <a:srgbClr val="FFFFFF"/>
+                </a:solidFill>
+              </a14:hiddenFill>
+            </a:ext>
+          </a:extLst>
+        </p:spPr>
+      </p:pic>
+    </p:spTree>
+    <p:extLst>
+      <p:ext uri="{BB962C8B-B14F-4D97-AF65-F5344CB8AC3E}">
+        <p14:creationId xmlns:p14="http://schemas.microsoft.com/office/powerpoint/2010/main" val="3514369580"/>
+      </p:ext>
+    </p:extLst>
+  </p:cSld>
+  <p:clrMapOvr>
+    <a:masterClrMapping/>
+  </p:clrMapOvr>
+</p:sld>
+</file>
+
+<file path=ppt/slides/slide105.xml><?xml version="1.0" encoding="utf-8"?>
+<p:sld xmlns:a="http://schemas.openxmlformats.org/drawingml/2006/main" xmlns:r="http://schemas.openxmlformats.org/officeDocument/2006/relationships" xmlns:p="http://schemas.openxmlformats.org/presentationml/2006/main">
+  <p:cSld>
+    <p:spTree>
+      <p:nvGrpSpPr>
+        <p:cNvPr id="1" name=""/>
+        <p:cNvGrpSpPr/>
+        <p:nvPr/>
+      </p:nvGrpSpPr>
+      <p:grpSpPr>
+        <a:xfrm>
+          <a:off x="0" y="0"/>
+          <a:ext cx="0" cy="0"/>
+          <a:chOff x="0" y="0"/>
+          <a:chExt cx="0" cy="0"/>
+        </a:xfrm>
+      </p:grpSpPr>
+      <p:sp>
+        <p:nvSpPr>
+          <p:cNvPr id="2" name="Titel 1">
+            <a:extLst>
+              <a:ext uri="{FF2B5EF4-FFF2-40B4-BE49-F238E27FC236}">
+                <a16:creationId xmlns:a16="http://schemas.microsoft.com/office/drawing/2014/main" id="{C9BD76A8-BE21-665B-93BE-44D6A8DBF055}"/>
+              </a:ext>
+            </a:extLst>
+          </p:cNvPr>
+          <p:cNvSpPr>
+            <a:spLocks noGrp="1"/>
+          </p:cNvSpPr>
+          <p:nvPr>
+            <p:ph type="ctrTitle"/>
+          </p:nvPr>
+        </p:nvSpPr>
+        <p:spPr>
+          <a:xfrm>
+            <a:off x="1876424" y="1122363"/>
+            <a:ext cx="10212112" cy="2387600"/>
+          </a:xfrm>
+        </p:spPr>
+        <p:txBody>
+          <a:bodyPr/>
+          <a:lstStyle/>
+          <a:p>
+            <a:r>
+              <a:rPr lang="de-DE" dirty="0"/>
+              <a:t>Vielen Dank für eure Teilnahme und Aufmerksamkeit!</a:t>
+            </a:r>
+          </a:p>
+        </p:txBody>
+      </p:sp>
+      <p:sp>
+        <p:nvSpPr>
+          <p:cNvPr id="3" name="Untertitel 2">
+            <a:extLst>
+              <a:ext uri="{FF2B5EF4-FFF2-40B4-BE49-F238E27FC236}">
+                <a16:creationId xmlns:a16="http://schemas.microsoft.com/office/drawing/2014/main" id="{D704DEAA-F286-F758-3D15-51645F3CCFA6}"/>
+              </a:ext>
+            </a:extLst>
+          </p:cNvPr>
+          <p:cNvSpPr>
+            <a:spLocks noGrp="1"/>
+          </p:cNvSpPr>
+          <p:nvPr>
+            <p:ph type="subTitle" idx="1"/>
+          </p:nvPr>
+        </p:nvSpPr>
+        <p:spPr/>
+        <p:txBody>
+          <a:bodyPr/>
+          <a:lstStyle/>
+          <a:p>
+            <a:r>
+              <a:rPr lang="de-DE" dirty="0"/>
+              <a:t>Jetzt gibt‘s noch ne kleine Umfrage und ihr seid erlöst :D</a:t>
+            </a:r>
+          </a:p>
+        </p:txBody>
+      </p:sp>
+      <p:pic>
+        <p:nvPicPr>
+          <p:cNvPr id="4" name="Grafik 3">
+            <a:extLst>
+              <a:ext uri="{FF2B5EF4-FFF2-40B4-BE49-F238E27FC236}">
+                <a16:creationId xmlns:a16="http://schemas.microsoft.com/office/drawing/2014/main" id="{AEFB535C-41FB-0748-952B-8251162807AD}"/>
+              </a:ext>
+            </a:extLst>
+          </p:cNvPr>
+          <p:cNvPicPr>
+            <a:picLocks noChangeAspect="1"/>
+          </p:cNvPicPr>
+          <p:nvPr/>
+        </p:nvPicPr>
+        <p:blipFill rotWithShape="1">
+          <a:blip r:embed="rId2">
+            <a:extLst>
+              <a:ext uri="{28A0092B-C50C-407E-A947-70E740481C1C}">
+                <a14:useLocalDpi xmlns:a14="http://schemas.microsoft.com/office/drawing/2010/main" val="0"/>
+              </a:ext>
+            </a:extLst>
+          </a:blip>
+          <a:srcRect t="28087" b="49492"/>
+          <a:stretch/>
+        </p:blipFill>
+        <p:spPr>
+          <a:xfrm>
+            <a:off x="10093910" y="6280840"/>
+            <a:ext cx="2018191" cy="452502"/>
+          </a:xfrm>
+          <a:prstGeom prst="roundRect">
+            <a:avLst>
+              <a:gd name="adj" fmla="val 16541"/>
+            </a:avLst>
+          </a:prstGeom>
+          <a:solidFill>
+            <a:srgbClr val="FFFFFF">
+              <a:shade val="85000"/>
+            </a:srgbClr>
+          </a:solidFill>
+          <a:ln>
+            <a:noFill/>
+          </a:ln>
+          <a:effectLst>
+            <a:reflection blurRad="12700" stA="0" endPos="0" dist="5000" dir="5400000" sy="-100000" algn="bl" rotWithShape="0"/>
+          </a:effectLst>
+        </p:spPr>
+      </p:pic>
+    </p:spTree>
+    <p:extLst>
+      <p:ext uri="{BB962C8B-B14F-4D97-AF65-F5344CB8AC3E}">
+        <p14:creationId xmlns:p14="http://schemas.microsoft.com/office/powerpoint/2010/main" val="3077665599"/>
+      </p:ext>
+    </p:extLst>
+  </p:cSld>
+  <p:clrMapOvr>
+    <a:masterClrMapping/>
+  </p:clrMapOvr>
+</p:sld>
+</file>
+
 <file path=ppt/slides/slide11.xml><?xml version="1.0" encoding="utf-8"?>
 <p:sld xmlns:a="http://schemas.openxmlformats.org/drawingml/2006/main" xmlns:r="http://schemas.openxmlformats.org/officeDocument/2006/relationships" xmlns:p="http://schemas.openxmlformats.org/presentationml/2006/main">
   <p:cSld>
@@ -59139,7 +60935,9 @@
           </a:xfrm>
         </p:spPr>
         <p:txBody>
-          <a:bodyPr/>
+          <a:bodyPr>
+            <a:normAutofit/>
+          </a:bodyPr>
           <a:lstStyle/>
           <a:p>
             <a:r>
@@ -59149,57 +60947,135 @@
           </a:p>
         </p:txBody>
       </p:sp>
-      <p:pic>
-        <p:nvPicPr>
-          <p:cNvPr id="1026" name="Picture 2">
+      <p:sp>
+        <p:nvSpPr>
+          <p:cNvPr id="3" name="Textfeld 2">
             <a:extLst>
               <a:ext uri="{FF2B5EF4-FFF2-40B4-BE49-F238E27FC236}">
-                <a16:creationId xmlns:a16="http://schemas.microsoft.com/office/drawing/2014/main" id="{9330D00D-07A6-29DD-2D84-59C1D10837F0}"/>
+                <a16:creationId xmlns:a16="http://schemas.microsoft.com/office/drawing/2014/main" id="{99384273-E90C-0402-DCA7-4BB4965DAB86}"/>
               </a:ext>
             </a:extLst>
           </p:cNvPr>
-          <p:cNvPicPr>
-            <a:picLocks noChangeAspect="1" noChangeArrowheads="1"/>
-          </p:cNvPicPr>
+          <p:cNvSpPr txBox="1"/>
           <p:nvPr/>
-        </p:nvPicPr>
-        <p:blipFill>
-          <a:blip r:embed="rId2">
-            <a:extLst>
-              <a:ext uri="{28A0092B-C50C-407E-A947-70E740481C1C}">
-                <a14:useLocalDpi xmlns:a14="http://schemas.microsoft.com/office/drawing/2010/main" val="0"/>
-              </a:ext>
-            </a:extLst>
-          </a:blip>
-          <a:srcRect/>
-          <a:stretch>
-            <a:fillRect/>
-          </a:stretch>
-        </p:blipFill>
-        <p:spPr bwMode="auto">
+        </p:nvSpPr>
+        <p:spPr>
           <a:xfrm>
-            <a:off x="4229100" y="1562100"/>
-            <a:ext cx="3733800" cy="3733800"/>
+            <a:off x="2638921" y="2151727"/>
+            <a:ext cx="6914157" cy="2554545"/>
           </a:xfrm>
           <a:prstGeom prst="rect">
             <a:avLst/>
           </a:prstGeom>
           <a:noFill/>
-          <a:extLst>
-            <a:ext uri="{909E8E84-426E-40DD-AFC4-6F175D3DCCD1}">
-              <a14:hiddenFill xmlns:a14="http://schemas.microsoft.com/office/drawing/2010/main">
-                <a:solidFill>
-                  <a:srgbClr val="FFFFFF"/>
-                </a:solidFill>
-              </a14:hiddenFill>
-            </a:ext>
-          </a:extLst>
         </p:spPr>
-      </p:pic>
+        <p:txBody>
+          <a:bodyPr wrap="square" rtlCol="0">
+            <a:spAutoFit/>
+          </a:bodyPr>
+          <a:lstStyle/>
+          <a:p>
+            <a:r>
+              <a:rPr lang="de-DE" sz="4000" dirty="0" err="1">
+                <a:solidFill>
+                  <a:schemeClr val="bg2">
+                    <a:lumMod val="60000"/>
+                    <a:lumOff val="40000"/>
+                  </a:schemeClr>
+                </a:solidFill>
+              </a:rPr>
+              <a:t>public</a:t>
+            </a:r>
+            <a:r>
+              <a:rPr lang="de-DE" sz="4000" dirty="0">
+                <a:solidFill>
+                  <a:schemeClr val="bg2">
+                    <a:lumMod val="60000"/>
+                    <a:lumOff val="40000"/>
+                  </a:schemeClr>
+                </a:solidFill>
+              </a:rPr>
+              <a:t> </a:t>
+            </a:r>
+            <a:r>
+              <a:rPr lang="de-DE" sz="4000" dirty="0" err="1">
+                <a:solidFill>
+                  <a:schemeClr val="bg2">
+                    <a:lumMod val="60000"/>
+                    <a:lumOff val="40000"/>
+                  </a:schemeClr>
+                </a:solidFill>
+              </a:rPr>
+              <a:t>void</a:t>
+            </a:r>
+            <a:r>
+              <a:rPr lang="de-DE" sz="4000" dirty="0">
+                <a:solidFill>
+                  <a:schemeClr val="bg2">
+                    <a:lumMod val="60000"/>
+                    <a:lumOff val="40000"/>
+                  </a:schemeClr>
+                </a:solidFill>
+              </a:rPr>
+              <a:t> </a:t>
+            </a:r>
+            <a:r>
+              <a:rPr lang="de-DE" sz="4000" dirty="0" err="1">
+                <a:solidFill>
+                  <a:srgbClr val="FFFF00"/>
+                </a:solidFill>
+              </a:rPr>
+              <a:t>rekursionsBeispiel</a:t>
+            </a:r>
+            <a:r>
+              <a:rPr lang="de-DE" sz="4000" dirty="0"/>
+              <a:t>(){</a:t>
+            </a:r>
+          </a:p>
+          <a:p>
+            <a:r>
+              <a:rPr lang="de-DE" sz="4000" dirty="0"/>
+              <a:t>	</a:t>
+            </a:r>
+            <a:r>
+              <a:rPr lang="de-DE" sz="4000" dirty="0" err="1"/>
+              <a:t>System.out.println</a:t>
+            </a:r>
+            <a:r>
+              <a:rPr lang="de-DE" sz="4000" dirty="0"/>
+              <a:t>(„Rekursion“);</a:t>
+            </a:r>
+          </a:p>
+          <a:p>
+            <a:r>
+              <a:rPr lang="de-DE" sz="4000" dirty="0"/>
+              <a:t>	</a:t>
+            </a:r>
+            <a:r>
+              <a:rPr lang="de-DE" sz="4000" dirty="0" err="1">
+                <a:solidFill>
+                  <a:srgbClr val="FFFF00"/>
+                </a:solidFill>
+              </a:rPr>
+              <a:t>rekursionsBeispiel</a:t>
+            </a:r>
+            <a:r>
+              <a:rPr lang="de-DE" sz="4000" dirty="0"/>
+              <a:t>();</a:t>
+            </a:r>
+          </a:p>
+          <a:p>
+            <a:r>
+              <a:rPr lang="de-DE" sz="4000" dirty="0"/>
+              <a:t>}</a:t>
+            </a:r>
+          </a:p>
+        </p:txBody>
+      </p:sp>
     </p:spTree>
     <p:extLst>
       <p:ext uri="{BB962C8B-B14F-4D97-AF65-F5344CB8AC3E}">
-        <p14:creationId xmlns:p14="http://schemas.microsoft.com/office/powerpoint/2010/main" val="3514369580"/>
+        <p14:creationId xmlns:p14="http://schemas.microsoft.com/office/powerpoint/2010/main" val="1820735110"/>
       </p:ext>
     </p:extLst>
   </p:cSld>
@@ -59231,7 +61107,7 @@
           <p:cNvPr id="2" name="Titel 1">
             <a:extLst>
               <a:ext uri="{FF2B5EF4-FFF2-40B4-BE49-F238E27FC236}">
-                <a16:creationId xmlns:a16="http://schemas.microsoft.com/office/drawing/2014/main" id="{C9BD76A8-BE21-665B-93BE-44D6A8DBF055}"/>
+                <a16:creationId xmlns:a16="http://schemas.microsoft.com/office/drawing/2014/main" id="{A2422126-BAFC-DB90-D5A7-9994DF5CC9A1}"/>
               </a:ext>
             </a:extLst>
           </p:cNvPr>
@@ -59239,32 +61115,219 @@
             <a:spLocks noGrp="1"/>
           </p:cNvSpPr>
           <p:nvPr>
-            <p:ph type="ctrTitle"/>
+            <p:ph type="title"/>
           </p:nvPr>
         </p:nvSpPr>
         <p:spPr>
           <a:xfrm>
-            <a:off x="1876424" y="1122363"/>
-            <a:ext cx="10212112" cy="2387600"/>
+            <a:off x="71437" y="164002"/>
+            <a:ext cx="6824663" cy="739285"/>
           </a:xfrm>
         </p:spPr>
         <p:txBody>
-          <a:bodyPr/>
+          <a:bodyPr>
+            <a:normAutofit/>
+          </a:bodyPr>
           <a:lstStyle/>
           <a:p>
             <a:r>
               <a:rPr lang="de-DE" dirty="0"/>
-              <a:t>Vielen Dank für eure Teilnahme und Aufmerksamkeit!</a:t>
+              <a:t>Rekursion</a:t>
             </a:r>
           </a:p>
         </p:txBody>
       </p:sp>
       <p:sp>
         <p:nvSpPr>
-          <p:cNvPr id="3" name="Untertitel 2">
+          <p:cNvPr id="3" name="Textfeld 2">
             <a:extLst>
               <a:ext uri="{FF2B5EF4-FFF2-40B4-BE49-F238E27FC236}">
-                <a16:creationId xmlns:a16="http://schemas.microsoft.com/office/drawing/2014/main" id="{D704DEAA-F286-F758-3D15-51645F3CCFA6}"/>
+                <a16:creationId xmlns:a16="http://schemas.microsoft.com/office/drawing/2014/main" id="{99384273-E90C-0402-DCA7-4BB4965DAB86}"/>
+              </a:ext>
+            </a:extLst>
+          </p:cNvPr>
+          <p:cNvSpPr txBox="1"/>
+          <p:nvPr/>
+        </p:nvSpPr>
+        <p:spPr>
+          <a:xfrm>
+            <a:off x="2638921" y="2151727"/>
+            <a:ext cx="6914157" cy="2554545"/>
+          </a:xfrm>
+          <a:prstGeom prst="rect">
+            <a:avLst/>
+          </a:prstGeom>
+          <a:noFill/>
+        </p:spPr>
+        <p:txBody>
+          <a:bodyPr wrap="square" rtlCol="0">
+            <a:spAutoFit/>
+          </a:bodyPr>
+          <a:lstStyle/>
+          <a:p>
+            <a:r>
+              <a:rPr lang="de-DE" sz="4000" dirty="0" err="1">
+                <a:solidFill>
+                  <a:schemeClr val="tx1">
+                    <a:lumMod val="50000"/>
+                  </a:schemeClr>
+                </a:solidFill>
+              </a:rPr>
+              <a:t>public</a:t>
+            </a:r>
+            <a:r>
+              <a:rPr lang="de-DE" sz="4000" dirty="0">
+                <a:solidFill>
+                  <a:schemeClr val="tx1">
+                    <a:lumMod val="50000"/>
+                  </a:schemeClr>
+                </a:solidFill>
+              </a:rPr>
+              <a:t> </a:t>
+            </a:r>
+            <a:r>
+              <a:rPr lang="de-DE" sz="4000" dirty="0" err="1">
+                <a:solidFill>
+                  <a:schemeClr val="tx1">
+                    <a:lumMod val="50000"/>
+                  </a:schemeClr>
+                </a:solidFill>
+              </a:rPr>
+              <a:t>void</a:t>
+            </a:r>
+            <a:r>
+              <a:rPr lang="de-DE" sz="4000" dirty="0">
+                <a:solidFill>
+                  <a:schemeClr val="tx1">
+                    <a:lumMod val="50000"/>
+                  </a:schemeClr>
+                </a:solidFill>
+              </a:rPr>
+              <a:t> </a:t>
+            </a:r>
+            <a:r>
+              <a:rPr lang="de-DE" sz="4000" dirty="0" err="1">
+                <a:solidFill>
+                  <a:srgbClr val="FFFF00"/>
+                </a:solidFill>
+              </a:rPr>
+              <a:t>rekursionsBeispiel</a:t>
+            </a:r>
+            <a:r>
+              <a:rPr lang="de-DE" sz="4000" dirty="0"/>
+              <a:t>()</a:t>
+            </a:r>
+            <a:r>
+              <a:rPr lang="de-DE" sz="4000" dirty="0">
+                <a:solidFill>
+                  <a:schemeClr val="tx1">
+                    <a:lumMod val="50000"/>
+                  </a:schemeClr>
+                </a:solidFill>
+              </a:rPr>
+              <a:t>{</a:t>
+            </a:r>
+          </a:p>
+          <a:p>
+            <a:r>
+              <a:rPr lang="de-DE" sz="4000" dirty="0">
+                <a:solidFill>
+                  <a:schemeClr val="tx1">
+                    <a:lumMod val="50000"/>
+                  </a:schemeClr>
+                </a:solidFill>
+              </a:rPr>
+              <a:t>	</a:t>
+            </a:r>
+            <a:r>
+              <a:rPr lang="de-DE" sz="4000" dirty="0" err="1">
+                <a:solidFill>
+                  <a:schemeClr val="tx1">
+                    <a:lumMod val="50000"/>
+                  </a:schemeClr>
+                </a:solidFill>
+              </a:rPr>
+              <a:t>System.out.println</a:t>
+            </a:r>
+            <a:r>
+              <a:rPr lang="de-DE" sz="4000" dirty="0">
+                <a:solidFill>
+                  <a:schemeClr val="tx1">
+                    <a:lumMod val="50000"/>
+                  </a:schemeClr>
+                </a:solidFill>
+              </a:rPr>
+              <a:t>(„Rekursion“);</a:t>
+            </a:r>
+          </a:p>
+          <a:p>
+            <a:r>
+              <a:rPr lang="de-DE" sz="4000" dirty="0"/>
+              <a:t>	</a:t>
+            </a:r>
+            <a:r>
+              <a:rPr lang="de-DE" sz="4000" dirty="0" err="1">
+                <a:solidFill>
+                  <a:srgbClr val="FFFF00"/>
+                </a:solidFill>
+              </a:rPr>
+              <a:t>rekursionsBeispiel</a:t>
+            </a:r>
+            <a:r>
+              <a:rPr lang="de-DE" sz="4000" dirty="0"/>
+              <a:t>();</a:t>
+            </a:r>
+          </a:p>
+          <a:p>
+            <a:r>
+              <a:rPr lang="de-DE" sz="4000" dirty="0">
+                <a:solidFill>
+                  <a:schemeClr val="tx1">
+                    <a:lumMod val="50000"/>
+                  </a:schemeClr>
+                </a:solidFill>
+              </a:rPr>
+              <a:t>}</a:t>
+            </a:r>
+          </a:p>
+        </p:txBody>
+      </p:sp>
+    </p:spTree>
+    <p:extLst>
+      <p:ext uri="{BB962C8B-B14F-4D97-AF65-F5344CB8AC3E}">
+        <p14:creationId xmlns:p14="http://schemas.microsoft.com/office/powerpoint/2010/main" val="2966190641"/>
+      </p:ext>
+    </p:extLst>
+  </p:cSld>
+  <p:clrMapOvr>
+    <a:masterClrMapping/>
+  </p:clrMapOvr>
+</p:sld>
+</file>
+
+<file path=ppt/slides/slide97.xml><?xml version="1.0" encoding="utf-8"?>
+<p:sld xmlns:a="http://schemas.openxmlformats.org/drawingml/2006/main" xmlns:r="http://schemas.openxmlformats.org/officeDocument/2006/relationships" xmlns:p="http://schemas.openxmlformats.org/presentationml/2006/main">
+  <p:cSld>
+    <p:spTree>
+      <p:nvGrpSpPr>
+        <p:cNvPr id="1" name=""/>
+        <p:cNvGrpSpPr/>
+        <p:nvPr/>
+      </p:nvGrpSpPr>
+      <p:grpSpPr>
+        <a:xfrm>
+          <a:off x="0" y="0"/>
+          <a:ext cx="0" cy="0"/>
+          <a:chOff x="0" y="0"/>
+          <a:chExt cx="0" cy="0"/>
+        </a:xfrm>
+      </p:grpSpPr>
+      <p:sp>
+        <p:nvSpPr>
+          <p:cNvPr id="2" name="Titel 1">
+            <a:extLst>
+              <a:ext uri="{FF2B5EF4-FFF2-40B4-BE49-F238E27FC236}">
+                <a16:creationId xmlns:a16="http://schemas.microsoft.com/office/drawing/2014/main" id="{A2422126-BAFC-DB90-D5A7-9994DF5CC9A1}"/>
               </a:ext>
             </a:extLst>
           </p:cNvPr>
@@ -59272,73 +61335,918 @@
             <a:spLocks noGrp="1"/>
           </p:cNvSpPr>
           <p:nvPr>
-            <p:ph type="subTitle" idx="1"/>
+            <p:ph type="title"/>
           </p:nvPr>
         </p:nvSpPr>
-        <p:spPr/>
+        <p:spPr>
+          <a:xfrm>
+            <a:off x="71437" y="164002"/>
+            <a:ext cx="6824663" cy="739285"/>
+          </a:xfrm>
+        </p:spPr>
         <p:txBody>
-          <a:bodyPr/>
+          <a:bodyPr>
+            <a:normAutofit/>
+          </a:bodyPr>
           <a:lstStyle/>
           <a:p>
             <a:r>
               <a:rPr lang="de-DE" dirty="0"/>
-              <a:t>Jetzt gibt‘s noch ne kleine Umfrage und ihr seid erlöst :D</a:t>
+              <a:t>Rekursion</a:t>
             </a:r>
           </a:p>
         </p:txBody>
       </p:sp>
-      <p:pic>
-        <p:nvPicPr>
-          <p:cNvPr id="4" name="Grafik 3">
+      <p:sp>
+        <p:nvSpPr>
+          <p:cNvPr id="3" name="Textfeld 2">
             <a:extLst>
               <a:ext uri="{FF2B5EF4-FFF2-40B4-BE49-F238E27FC236}">
-                <a16:creationId xmlns:a16="http://schemas.microsoft.com/office/drawing/2014/main" id="{AEFB535C-41FB-0748-952B-8251162807AD}"/>
+                <a16:creationId xmlns:a16="http://schemas.microsoft.com/office/drawing/2014/main" id="{99384273-E90C-0402-DCA7-4BB4965DAB86}"/>
               </a:ext>
             </a:extLst>
           </p:cNvPr>
-          <p:cNvPicPr>
-            <a:picLocks noChangeAspect="1"/>
-          </p:cNvPicPr>
+          <p:cNvSpPr txBox="1"/>
           <p:nvPr/>
-        </p:nvPicPr>
-        <p:blipFill rotWithShape="1">
-          <a:blip r:embed="rId2">
+        </p:nvSpPr>
+        <p:spPr>
+          <a:xfrm>
+            <a:off x="2638921" y="2151727"/>
+            <a:ext cx="6914157" cy="2554545"/>
+          </a:xfrm>
+          <a:prstGeom prst="rect">
+            <a:avLst/>
+          </a:prstGeom>
+          <a:noFill/>
+        </p:spPr>
+        <p:txBody>
+          <a:bodyPr wrap="square" rtlCol="0">
+            <a:spAutoFit/>
+          </a:bodyPr>
+          <a:lstStyle/>
+          <a:p>
+            <a:r>
+              <a:rPr lang="de-DE" sz="4000" dirty="0" err="1">
+                <a:solidFill>
+                  <a:schemeClr val="tx1">
+                    <a:lumMod val="50000"/>
+                  </a:schemeClr>
+                </a:solidFill>
+              </a:rPr>
+              <a:t>public</a:t>
+            </a:r>
+            <a:r>
+              <a:rPr lang="de-DE" sz="4000" dirty="0">
+                <a:solidFill>
+                  <a:schemeClr val="tx1">
+                    <a:lumMod val="50000"/>
+                  </a:schemeClr>
+                </a:solidFill>
+              </a:rPr>
+              <a:t> </a:t>
+            </a:r>
+            <a:r>
+              <a:rPr lang="de-DE" sz="4000" dirty="0" err="1">
+                <a:solidFill>
+                  <a:schemeClr val="tx1">
+                    <a:lumMod val="50000"/>
+                  </a:schemeClr>
+                </a:solidFill>
+              </a:rPr>
+              <a:t>void</a:t>
+            </a:r>
+            <a:r>
+              <a:rPr lang="de-DE" sz="4000" dirty="0">
+                <a:solidFill>
+                  <a:schemeClr val="tx1">
+                    <a:lumMod val="50000"/>
+                  </a:schemeClr>
+                </a:solidFill>
+              </a:rPr>
+              <a:t> </a:t>
+            </a:r>
+            <a:r>
+              <a:rPr lang="de-DE" sz="4000" dirty="0" err="1">
+                <a:solidFill>
+                  <a:srgbClr val="FFFF00"/>
+                </a:solidFill>
+              </a:rPr>
+              <a:t>rekursionsBeispiel</a:t>
+            </a:r>
+            <a:r>
+              <a:rPr lang="de-DE" sz="4000" dirty="0"/>
+              <a:t>()</a:t>
+            </a:r>
+            <a:r>
+              <a:rPr lang="de-DE" sz="4000" dirty="0">
+                <a:solidFill>
+                  <a:schemeClr val="tx1">
+                    <a:lumMod val="50000"/>
+                  </a:schemeClr>
+                </a:solidFill>
+              </a:rPr>
+              <a:t>{</a:t>
+            </a:r>
+          </a:p>
+          <a:p>
+            <a:r>
+              <a:rPr lang="de-DE" sz="4000" dirty="0">
+                <a:solidFill>
+                  <a:schemeClr val="tx1">
+                    <a:lumMod val="50000"/>
+                  </a:schemeClr>
+                </a:solidFill>
+              </a:rPr>
+              <a:t>	</a:t>
+            </a:r>
+            <a:r>
+              <a:rPr lang="de-DE" sz="4000" dirty="0" err="1">
+                <a:solidFill>
+                  <a:schemeClr val="tx1">
+                    <a:lumMod val="50000"/>
+                  </a:schemeClr>
+                </a:solidFill>
+              </a:rPr>
+              <a:t>System.out.println</a:t>
+            </a:r>
+            <a:r>
+              <a:rPr lang="de-DE" sz="4000" dirty="0">
+                <a:solidFill>
+                  <a:schemeClr val="tx1">
+                    <a:lumMod val="50000"/>
+                  </a:schemeClr>
+                </a:solidFill>
+              </a:rPr>
+              <a:t>(„Rekursion“);</a:t>
+            </a:r>
+          </a:p>
+          <a:p>
+            <a:r>
+              <a:rPr lang="de-DE" sz="4000" dirty="0"/>
+              <a:t>	</a:t>
+            </a:r>
+            <a:r>
+              <a:rPr lang="de-DE" sz="4000" dirty="0" err="1">
+                <a:solidFill>
+                  <a:srgbClr val="FFFF00"/>
+                </a:solidFill>
+              </a:rPr>
+              <a:t>rekursionsBeispiel</a:t>
+            </a:r>
+            <a:r>
+              <a:rPr lang="de-DE" sz="4000" dirty="0"/>
+              <a:t>();</a:t>
+            </a:r>
+          </a:p>
+          <a:p>
+            <a:r>
+              <a:rPr lang="de-DE" sz="4000" dirty="0">
+                <a:solidFill>
+                  <a:schemeClr val="tx1">
+                    <a:lumMod val="50000"/>
+                  </a:schemeClr>
+                </a:solidFill>
+              </a:rPr>
+              <a:t>}</a:t>
+            </a:r>
+          </a:p>
+        </p:txBody>
+      </p:sp>
+      <p:sp>
+        <p:nvSpPr>
+          <p:cNvPr id="4" name="Textfeld 3">
             <a:extLst>
-              <a:ext uri="{28A0092B-C50C-407E-A947-70E740481C1C}">
-                <a14:useLocalDpi xmlns:a14="http://schemas.microsoft.com/office/drawing/2010/main" val="0"/>
+              <a:ext uri="{FF2B5EF4-FFF2-40B4-BE49-F238E27FC236}">
+                <a16:creationId xmlns:a16="http://schemas.microsoft.com/office/drawing/2014/main" id="{8DA1E8DB-64FA-9191-3235-1A1A96093B42}"/>
               </a:ext>
             </a:extLst>
-          </a:blip>
-          <a:srcRect t="28087" b="49492"/>
-          <a:stretch/>
-        </p:blipFill>
+          </p:cNvPr>
+          <p:cNvSpPr txBox="1"/>
+          <p:nvPr/>
+        </p:nvSpPr>
         <p:spPr>
           <a:xfrm>
-            <a:off x="10093910" y="6280840"/>
-            <a:ext cx="2018191" cy="452502"/>
+            <a:off x="1943449" y="5123715"/>
+            <a:ext cx="8305100" cy="830997"/>
           </a:xfrm>
-          <a:prstGeom prst="roundRect">
-            <a:avLst>
-              <a:gd name="adj" fmla="val 16541"/>
-            </a:avLst>
+          <a:prstGeom prst="rect">
+            <a:avLst/>
           </a:prstGeom>
-          <a:solidFill>
-            <a:srgbClr val="FFFFFF">
-              <a:shade val="85000"/>
-            </a:srgbClr>
-          </a:solidFill>
-          <a:ln>
-            <a:noFill/>
-          </a:ln>
-          <a:effectLst>
-            <a:reflection blurRad="12700" stA="0" endPos="0" dist="5000" dir="5400000" sy="-100000" algn="bl" rotWithShape="0"/>
-          </a:effectLst>
+          <a:noFill/>
         </p:spPr>
-      </p:pic>
+        <p:txBody>
+          <a:bodyPr wrap="square" rtlCol="0">
+            <a:spAutoFit/>
+          </a:bodyPr>
+          <a:lstStyle/>
+          <a:p>
+            <a:pPr algn="ctr"/>
+            <a:r>
+              <a:rPr lang="de-DE" sz="2400" dirty="0"/>
+              <a:t>Die Methode </a:t>
+            </a:r>
+            <a:r>
+              <a:rPr lang="de-DE" sz="2400" dirty="0" err="1">
+                <a:solidFill>
+                  <a:srgbClr val="FFFF00"/>
+                </a:solidFill>
+              </a:rPr>
+              <a:t>rekursionsBeispiel</a:t>
+            </a:r>
+            <a:r>
+              <a:rPr lang="de-DE" sz="2400" dirty="0"/>
+              <a:t>() ruft </a:t>
+            </a:r>
+            <a:r>
+              <a:rPr lang="de-DE" sz="2400" u="sng" dirty="0"/>
+              <a:t>sich selbst auf</a:t>
+            </a:r>
+            <a:r>
+              <a:rPr lang="de-DE" sz="2400" dirty="0"/>
+              <a:t> und erzeugt dadurch eine Schleife. Das ist Rekursion</a:t>
+            </a:r>
+          </a:p>
+        </p:txBody>
+      </p:sp>
     </p:spTree>
     <p:extLst>
       <p:ext uri="{BB962C8B-B14F-4D97-AF65-F5344CB8AC3E}">
-        <p14:creationId xmlns:p14="http://schemas.microsoft.com/office/powerpoint/2010/main" val="3077665599"/>
+        <p14:creationId xmlns:p14="http://schemas.microsoft.com/office/powerpoint/2010/main" val="2820711740"/>
+      </p:ext>
+    </p:extLst>
+  </p:cSld>
+  <p:clrMapOvr>
+    <a:masterClrMapping/>
+  </p:clrMapOvr>
+</p:sld>
+</file>
+
+<file path=ppt/slides/slide98.xml><?xml version="1.0" encoding="utf-8"?>
+<p:sld xmlns:a="http://schemas.openxmlformats.org/drawingml/2006/main" xmlns:r="http://schemas.openxmlformats.org/officeDocument/2006/relationships" xmlns:p="http://schemas.openxmlformats.org/presentationml/2006/main">
+  <p:cSld>
+    <p:spTree>
+      <p:nvGrpSpPr>
+        <p:cNvPr id="1" name=""/>
+        <p:cNvGrpSpPr/>
+        <p:nvPr/>
+      </p:nvGrpSpPr>
+      <p:grpSpPr>
+        <a:xfrm>
+          <a:off x="0" y="0"/>
+          <a:ext cx="0" cy="0"/>
+          <a:chOff x="0" y="0"/>
+          <a:chExt cx="0" cy="0"/>
+        </a:xfrm>
+      </p:grpSpPr>
+      <p:sp>
+        <p:nvSpPr>
+          <p:cNvPr id="2" name="Titel 1">
+            <a:extLst>
+              <a:ext uri="{FF2B5EF4-FFF2-40B4-BE49-F238E27FC236}">
+                <a16:creationId xmlns:a16="http://schemas.microsoft.com/office/drawing/2014/main" id="{A2422126-BAFC-DB90-D5A7-9994DF5CC9A1}"/>
+              </a:ext>
+            </a:extLst>
+          </p:cNvPr>
+          <p:cNvSpPr>
+            <a:spLocks noGrp="1"/>
+          </p:cNvSpPr>
+          <p:nvPr>
+            <p:ph type="title"/>
+          </p:nvPr>
+        </p:nvSpPr>
+        <p:spPr>
+          <a:xfrm>
+            <a:off x="71437" y="164002"/>
+            <a:ext cx="6824663" cy="739285"/>
+          </a:xfrm>
+        </p:spPr>
+        <p:txBody>
+          <a:bodyPr>
+            <a:normAutofit/>
+          </a:bodyPr>
+          <a:lstStyle/>
+          <a:p>
+            <a:r>
+              <a:rPr lang="de-DE" dirty="0"/>
+              <a:t>Rekursion</a:t>
+            </a:r>
+          </a:p>
+        </p:txBody>
+      </p:sp>
+      <p:sp>
+        <p:nvSpPr>
+          <p:cNvPr id="3" name="Textfeld 2">
+            <a:extLst>
+              <a:ext uri="{FF2B5EF4-FFF2-40B4-BE49-F238E27FC236}">
+                <a16:creationId xmlns:a16="http://schemas.microsoft.com/office/drawing/2014/main" id="{99384273-E90C-0402-DCA7-4BB4965DAB86}"/>
+              </a:ext>
+            </a:extLst>
+          </p:cNvPr>
+          <p:cNvSpPr txBox="1"/>
+          <p:nvPr/>
+        </p:nvSpPr>
+        <p:spPr>
+          <a:xfrm>
+            <a:off x="3158048" y="920621"/>
+            <a:ext cx="5875904" cy="5016758"/>
+          </a:xfrm>
+          <a:prstGeom prst="rect">
+            <a:avLst/>
+          </a:prstGeom>
+          <a:noFill/>
+        </p:spPr>
+        <p:txBody>
+          <a:bodyPr wrap="square" rtlCol="0">
+            <a:spAutoFit/>
+          </a:bodyPr>
+          <a:lstStyle/>
+          <a:p>
+            <a:r>
+              <a:rPr lang="de-DE" sz="4000" dirty="0" err="1">
+                <a:solidFill>
+                  <a:schemeClr val="bg2">
+                    <a:lumMod val="60000"/>
+                    <a:lumOff val="40000"/>
+                  </a:schemeClr>
+                </a:solidFill>
+              </a:rPr>
+              <a:t>public</a:t>
+            </a:r>
+            <a:r>
+              <a:rPr lang="de-DE" sz="4000" dirty="0">
+                <a:solidFill>
+                  <a:schemeClr val="bg2">
+                    <a:lumMod val="60000"/>
+                    <a:lumOff val="40000"/>
+                  </a:schemeClr>
+                </a:solidFill>
+              </a:rPr>
+              <a:t> </a:t>
+            </a:r>
+            <a:r>
+              <a:rPr lang="de-DE" sz="4000" dirty="0" err="1">
+                <a:solidFill>
+                  <a:schemeClr val="bg2">
+                    <a:lumMod val="60000"/>
+                    <a:lumOff val="40000"/>
+                  </a:schemeClr>
+                </a:solidFill>
+              </a:rPr>
+              <a:t>void</a:t>
+            </a:r>
+            <a:r>
+              <a:rPr lang="de-DE" sz="4000" dirty="0">
+                <a:solidFill>
+                  <a:schemeClr val="bg2">
+                    <a:lumMod val="60000"/>
+                    <a:lumOff val="40000"/>
+                  </a:schemeClr>
+                </a:solidFill>
+              </a:rPr>
+              <a:t> </a:t>
+            </a:r>
+            <a:r>
+              <a:rPr lang="de-DE" sz="4000" dirty="0" err="1">
+                <a:solidFill>
+                  <a:srgbClr val="FFFF00"/>
+                </a:solidFill>
+              </a:rPr>
+              <a:t>countRec</a:t>
+            </a:r>
+            <a:r>
+              <a:rPr lang="de-DE" sz="4000" dirty="0"/>
+              <a:t>(</a:t>
+            </a:r>
+            <a:r>
+              <a:rPr lang="de-DE" sz="4000" dirty="0" err="1">
+                <a:solidFill>
+                  <a:schemeClr val="bg2">
+                    <a:lumMod val="60000"/>
+                    <a:lumOff val="40000"/>
+                  </a:schemeClr>
+                </a:solidFill>
+              </a:rPr>
+              <a:t>int</a:t>
+            </a:r>
+            <a:r>
+              <a:rPr lang="de-DE" sz="4000" dirty="0"/>
+              <a:t> </a:t>
+            </a:r>
+            <a:r>
+              <a:rPr lang="de-DE" sz="4000" dirty="0">
+                <a:solidFill>
+                  <a:srgbClr val="FFFF00"/>
+                </a:solidFill>
+              </a:rPr>
+              <a:t>i</a:t>
+            </a:r>
+            <a:r>
+              <a:rPr lang="de-DE" sz="4000" dirty="0"/>
+              <a:t>){</a:t>
+            </a:r>
+          </a:p>
+          <a:p>
+            <a:r>
+              <a:rPr lang="de-DE" sz="4000" dirty="0"/>
+              <a:t>	</a:t>
+            </a:r>
+            <a:r>
+              <a:rPr lang="de-DE" sz="4000" dirty="0" err="1">
+                <a:solidFill>
+                  <a:schemeClr val="bg2">
+                    <a:lumMod val="60000"/>
+                    <a:lumOff val="40000"/>
+                  </a:schemeClr>
+                </a:solidFill>
+              </a:rPr>
+              <a:t>if</a:t>
+            </a:r>
+            <a:r>
+              <a:rPr lang="de-DE" sz="4000" dirty="0"/>
+              <a:t>(</a:t>
+            </a:r>
+            <a:r>
+              <a:rPr lang="de-DE" sz="4000" dirty="0">
+                <a:solidFill>
+                  <a:srgbClr val="FFFF00"/>
+                </a:solidFill>
+              </a:rPr>
+              <a:t>i</a:t>
+            </a:r>
+            <a:r>
+              <a:rPr lang="de-DE" sz="4000" dirty="0"/>
+              <a:t> == </a:t>
+            </a:r>
+            <a:r>
+              <a:rPr lang="de-DE" sz="4000" dirty="0">
+                <a:solidFill>
+                  <a:schemeClr val="accent6">
+                    <a:lumMod val="40000"/>
+                    <a:lumOff val="60000"/>
+                  </a:schemeClr>
+                </a:solidFill>
+              </a:rPr>
+              <a:t>0</a:t>
+            </a:r>
+            <a:r>
+              <a:rPr lang="de-DE" sz="4000" dirty="0"/>
+              <a:t>){</a:t>
+            </a:r>
+          </a:p>
+          <a:p>
+            <a:r>
+              <a:rPr lang="de-DE" sz="4000" dirty="0"/>
+              <a:t>		</a:t>
+            </a:r>
+            <a:r>
+              <a:rPr lang="de-DE" sz="4000" dirty="0" err="1"/>
+              <a:t>System.out.println</a:t>
+            </a:r>
+            <a:r>
+              <a:rPr lang="de-DE" sz="4000" dirty="0"/>
+              <a:t>(„0“);</a:t>
+            </a:r>
+          </a:p>
+          <a:p>
+            <a:r>
+              <a:rPr lang="de-DE" sz="4000" dirty="0"/>
+              <a:t>		</a:t>
+            </a:r>
+            <a:r>
+              <a:rPr lang="de-DE" sz="4000" dirty="0" err="1">
+                <a:solidFill>
+                  <a:schemeClr val="bg2">
+                    <a:lumMod val="60000"/>
+                    <a:lumOff val="40000"/>
+                  </a:schemeClr>
+                </a:solidFill>
+              </a:rPr>
+              <a:t>return</a:t>
+            </a:r>
+            <a:r>
+              <a:rPr lang="de-DE" sz="4000" dirty="0"/>
+              <a:t>;</a:t>
+            </a:r>
+          </a:p>
+          <a:p>
+            <a:r>
+              <a:rPr lang="de-DE" sz="4000" dirty="0"/>
+              <a:t>	}</a:t>
+            </a:r>
+          </a:p>
+          <a:p>
+            <a:r>
+              <a:rPr lang="de-DE" sz="4000" dirty="0"/>
+              <a:t>	</a:t>
+            </a:r>
+            <a:r>
+              <a:rPr lang="de-DE" sz="4000" dirty="0" err="1"/>
+              <a:t>System.out.println</a:t>
+            </a:r>
+            <a:r>
+              <a:rPr lang="de-DE" sz="4000" dirty="0"/>
+              <a:t>(</a:t>
+            </a:r>
+            <a:r>
+              <a:rPr lang="de-DE" sz="4000" dirty="0">
+                <a:solidFill>
+                  <a:srgbClr val="FFFF00"/>
+                </a:solidFill>
+              </a:rPr>
+              <a:t>i</a:t>
+            </a:r>
+            <a:r>
+              <a:rPr lang="de-DE" sz="4000" dirty="0"/>
+              <a:t>);</a:t>
+            </a:r>
+          </a:p>
+          <a:p>
+            <a:r>
+              <a:rPr lang="de-DE" sz="4000" dirty="0"/>
+              <a:t>	</a:t>
+            </a:r>
+            <a:r>
+              <a:rPr lang="de-DE" sz="4000" dirty="0">
+                <a:solidFill>
+                  <a:srgbClr val="FFFF00"/>
+                </a:solidFill>
+              </a:rPr>
+              <a:t> </a:t>
+            </a:r>
+            <a:r>
+              <a:rPr lang="de-DE" sz="4000" dirty="0" err="1">
+                <a:solidFill>
+                  <a:srgbClr val="FFFF00"/>
+                </a:solidFill>
+              </a:rPr>
+              <a:t>countRec</a:t>
+            </a:r>
+            <a:r>
+              <a:rPr lang="de-DE" sz="4000" dirty="0"/>
+              <a:t>(</a:t>
+            </a:r>
+            <a:r>
+              <a:rPr lang="de-DE" sz="4000" dirty="0">
+                <a:solidFill>
+                  <a:srgbClr val="FFFF00"/>
+                </a:solidFill>
+              </a:rPr>
+              <a:t>i</a:t>
+            </a:r>
+            <a:r>
+              <a:rPr lang="de-DE" sz="4000" dirty="0"/>
+              <a:t>-1);</a:t>
+            </a:r>
+          </a:p>
+          <a:p>
+            <a:r>
+              <a:rPr lang="de-DE" sz="4000" dirty="0"/>
+              <a:t>}</a:t>
+            </a:r>
+          </a:p>
+        </p:txBody>
+      </p:sp>
+    </p:spTree>
+    <p:extLst>
+      <p:ext uri="{BB962C8B-B14F-4D97-AF65-F5344CB8AC3E}">
+        <p14:creationId xmlns:p14="http://schemas.microsoft.com/office/powerpoint/2010/main" val="2713165740"/>
+      </p:ext>
+    </p:extLst>
+  </p:cSld>
+  <p:clrMapOvr>
+    <a:masterClrMapping/>
+  </p:clrMapOvr>
+</p:sld>
+</file>
+
+<file path=ppt/slides/slide99.xml><?xml version="1.0" encoding="utf-8"?>
+<p:sld xmlns:a="http://schemas.openxmlformats.org/drawingml/2006/main" xmlns:r="http://schemas.openxmlformats.org/officeDocument/2006/relationships" xmlns:p="http://schemas.openxmlformats.org/presentationml/2006/main">
+  <p:cSld>
+    <p:spTree>
+      <p:nvGrpSpPr>
+        <p:cNvPr id="1" name=""/>
+        <p:cNvGrpSpPr/>
+        <p:nvPr/>
+      </p:nvGrpSpPr>
+      <p:grpSpPr>
+        <a:xfrm>
+          <a:off x="0" y="0"/>
+          <a:ext cx="0" cy="0"/>
+          <a:chOff x="0" y="0"/>
+          <a:chExt cx="0" cy="0"/>
+        </a:xfrm>
+      </p:grpSpPr>
+      <p:sp>
+        <p:nvSpPr>
+          <p:cNvPr id="2" name="Titel 1">
+            <a:extLst>
+              <a:ext uri="{FF2B5EF4-FFF2-40B4-BE49-F238E27FC236}">
+                <a16:creationId xmlns:a16="http://schemas.microsoft.com/office/drawing/2014/main" id="{A2422126-BAFC-DB90-D5A7-9994DF5CC9A1}"/>
+              </a:ext>
+            </a:extLst>
+          </p:cNvPr>
+          <p:cNvSpPr>
+            <a:spLocks noGrp="1"/>
+          </p:cNvSpPr>
+          <p:nvPr>
+            <p:ph type="title"/>
+          </p:nvPr>
+        </p:nvSpPr>
+        <p:spPr>
+          <a:xfrm>
+            <a:off x="71437" y="164002"/>
+            <a:ext cx="6824663" cy="739285"/>
+          </a:xfrm>
+        </p:spPr>
+        <p:txBody>
+          <a:bodyPr>
+            <a:normAutofit/>
+          </a:bodyPr>
+          <a:lstStyle/>
+          <a:p>
+            <a:r>
+              <a:rPr lang="de-DE" dirty="0"/>
+              <a:t>Rekursion</a:t>
+            </a:r>
+          </a:p>
+        </p:txBody>
+      </p:sp>
+      <p:sp>
+        <p:nvSpPr>
+          <p:cNvPr id="3" name="Textfeld 2">
+            <a:extLst>
+              <a:ext uri="{FF2B5EF4-FFF2-40B4-BE49-F238E27FC236}">
+                <a16:creationId xmlns:a16="http://schemas.microsoft.com/office/drawing/2014/main" id="{99384273-E90C-0402-DCA7-4BB4965DAB86}"/>
+              </a:ext>
+            </a:extLst>
+          </p:cNvPr>
+          <p:cNvSpPr txBox="1"/>
+          <p:nvPr/>
+        </p:nvSpPr>
+        <p:spPr>
+          <a:xfrm>
+            <a:off x="3158048" y="920621"/>
+            <a:ext cx="5875904" cy="5016758"/>
+          </a:xfrm>
+          <a:prstGeom prst="rect">
+            <a:avLst/>
+          </a:prstGeom>
+          <a:noFill/>
+        </p:spPr>
+        <p:txBody>
+          <a:bodyPr wrap="square" rtlCol="0">
+            <a:spAutoFit/>
+          </a:bodyPr>
+          <a:lstStyle/>
+          <a:p>
+            <a:r>
+              <a:rPr lang="de-DE" sz="4000" dirty="0" err="1">
+                <a:solidFill>
+                  <a:srgbClr val="7F7F7F"/>
+                </a:solidFill>
+              </a:rPr>
+              <a:t>public</a:t>
+            </a:r>
+            <a:r>
+              <a:rPr lang="de-DE" sz="4000" dirty="0">
+                <a:solidFill>
+                  <a:srgbClr val="7F7F7F"/>
+                </a:solidFill>
+              </a:rPr>
+              <a:t> </a:t>
+            </a:r>
+            <a:r>
+              <a:rPr lang="de-DE" sz="4000" dirty="0" err="1">
+                <a:solidFill>
+                  <a:srgbClr val="7F7F7F"/>
+                </a:solidFill>
+              </a:rPr>
+              <a:t>void</a:t>
+            </a:r>
+            <a:r>
+              <a:rPr lang="de-DE" sz="4000" dirty="0">
+                <a:solidFill>
+                  <a:srgbClr val="7F7F7F"/>
+                </a:solidFill>
+              </a:rPr>
+              <a:t> </a:t>
+            </a:r>
+            <a:r>
+              <a:rPr lang="de-DE" sz="4000" dirty="0" err="1">
+                <a:solidFill>
+                  <a:srgbClr val="FFFF00"/>
+                </a:solidFill>
+              </a:rPr>
+              <a:t>countRec</a:t>
+            </a:r>
+            <a:r>
+              <a:rPr lang="de-DE" sz="4000" dirty="0"/>
+              <a:t>(</a:t>
+            </a:r>
+            <a:r>
+              <a:rPr lang="de-DE" sz="4000" dirty="0" err="1">
+                <a:solidFill>
+                  <a:schemeClr val="bg2">
+                    <a:lumMod val="60000"/>
+                    <a:lumOff val="40000"/>
+                  </a:schemeClr>
+                </a:solidFill>
+              </a:rPr>
+              <a:t>int</a:t>
+            </a:r>
+            <a:r>
+              <a:rPr lang="de-DE" sz="4000" dirty="0"/>
+              <a:t> </a:t>
+            </a:r>
+            <a:r>
+              <a:rPr lang="de-DE" sz="4000" dirty="0">
+                <a:solidFill>
+                  <a:srgbClr val="FFFF00"/>
+                </a:solidFill>
+              </a:rPr>
+              <a:t>i</a:t>
+            </a:r>
+            <a:r>
+              <a:rPr lang="de-DE" sz="4000" dirty="0"/>
+              <a:t>)</a:t>
+            </a:r>
+            <a:r>
+              <a:rPr lang="de-DE" sz="4000" dirty="0">
+                <a:solidFill>
+                  <a:srgbClr val="7F7F7F"/>
+                </a:solidFill>
+              </a:rPr>
+              <a:t>{</a:t>
+            </a:r>
+          </a:p>
+          <a:p>
+            <a:r>
+              <a:rPr lang="de-DE" sz="4000" dirty="0">
+                <a:solidFill>
+                  <a:srgbClr val="7F7F7F"/>
+                </a:solidFill>
+              </a:rPr>
+              <a:t>	</a:t>
+            </a:r>
+            <a:r>
+              <a:rPr lang="de-DE" sz="4000" dirty="0" err="1">
+                <a:solidFill>
+                  <a:srgbClr val="7F7F7F"/>
+                </a:solidFill>
+              </a:rPr>
+              <a:t>if</a:t>
+            </a:r>
+            <a:r>
+              <a:rPr lang="de-DE" sz="4000" dirty="0">
+                <a:solidFill>
+                  <a:srgbClr val="7F7F7F"/>
+                </a:solidFill>
+              </a:rPr>
+              <a:t>(i == 0){</a:t>
+            </a:r>
+          </a:p>
+          <a:p>
+            <a:r>
+              <a:rPr lang="de-DE" sz="4000" dirty="0">
+                <a:solidFill>
+                  <a:srgbClr val="7F7F7F"/>
+                </a:solidFill>
+              </a:rPr>
+              <a:t>		</a:t>
+            </a:r>
+            <a:r>
+              <a:rPr lang="de-DE" sz="4000" dirty="0" err="1">
+                <a:solidFill>
+                  <a:srgbClr val="7F7F7F"/>
+                </a:solidFill>
+              </a:rPr>
+              <a:t>System.out.println</a:t>
+            </a:r>
+            <a:r>
+              <a:rPr lang="de-DE" sz="4000" dirty="0">
+                <a:solidFill>
+                  <a:srgbClr val="7F7F7F"/>
+                </a:solidFill>
+              </a:rPr>
+              <a:t>(„0“);</a:t>
+            </a:r>
+          </a:p>
+          <a:p>
+            <a:r>
+              <a:rPr lang="de-DE" sz="4000" dirty="0">
+                <a:solidFill>
+                  <a:srgbClr val="7F7F7F"/>
+                </a:solidFill>
+              </a:rPr>
+              <a:t>		</a:t>
+            </a:r>
+            <a:r>
+              <a:rPr lang="de-DE" sz="4000" dirty="0" err="1">
+                <a:solidFill>
+                  <a:srgbClr val="7F7F7F"/>
+                </a:solidFill>
+              </a:rPr>
+              <a:t>return</a:t>
+            </a:r>
+            <a:r>
+              <a:rPr lang="de-DE" sz="4000" dirty="0">
+                <a:solidFill>
+                  <a:srgbClr val="7F7F7F"/>
+                </a:solidFill>
+              </a:rPr>
+              <a:t>;</a:t>
+            </a:r>
+          </a:p>
+          <a:p>
+            <a:r>
+              <a:rPr lang="de-DE" sz="4000" dirty="0">
+                <a:solidFill>
+                  <a:srgbClr val="7F7F7F"/>
+                </a:solidFill>
+              </a:rPr>
+              <a:t>	}</a:t>
+            </a:r>
+          </a:p>
+          <a:p>
+            <a:r>
+              <a:rPr lang="de-DE" sz="4000" dirty="0">
+                <a:solidFill>
+                  <a:srgbClr val="7F7F7F"/>
+                </a:solidFill>
+              </a:rPr>
+              <a:t>	</a:t>
+            </a:r>
+            <a:r>
+              <a:rPr lang="de-DE" sz="4000" dirty="0" err="1">
+                <a:solidFill>
+                  <a:srgbClr val="7F7F7F"/>
+                </a:solidFill>
+              </a:rPr>
+              <a:t>System.out.println</a:t>
+            </a:r>
+            <a:r>
+              <a:rPr lang="de-DE" sz="4000" dirty="0">
+                <a:solidFill>
+                  <a:srgbClr val="7F7F7F"/>
+                </a:solidFill>
+              </a:rPr>
+              <a:t>(i);</a:t>
+            </a:r>
+          </a:p>
+          <a:p>
+            <a:r>
+              <a:rPr lang="de-DE" sz="4000" dirty="0"/>
+              <a:t>	</a:t>
+            </a:r>
+            <a:r>
+              <a:rPr lang="de-DE" sz="4000" dirty="0">
+                <a:solidFill>
+                  <a:srgbClr val="FFFF00"/>
+                </a:solidFill>
+              </a:rPr>
+              <a:t> </a:t>
+            </a:r>
+            <a:r>
+              <a:rPr lang="de-DE" sz="4000" dirty="0" err="1">
+                <a:solidFill>
+                  <a:srgbClr val="FFFF00"/>
+                </a:solidFill>
+              </a:rPr>
+              <a:t>countRec</a:t>
+            </a:r>
+            <a:r>
+              <a:rPr lang="de-DE" sz="4000" dirty="0"/>
+              <a:t>(</a:t>
+            </a:r>
+            <a:r>
+              <a:rPr lang="de-DE" sz="4000" dirty="0">
+                <a:solidFill>
+                  <a:srgbClr val="FFFF00"/>
+                </a:solidFill>
+              </a:rPr>
+              <a:t>i</a:t>
+            </a:r>
+            <a:r>
+              <a:rPr lang="de-DE" sz="4000" dirty="0"/>
+              <a:t>-1);</a:t>
+            </a:r>
+          </a:p>
+          <a:p>
+            <a:r>
+              <a:rPr lang="de-DE" sz="4000" dirty="0">
+                <a:solidFill>
+                  <a:srgbClr val="7F7F7F"/>
+                </a:solidFill>
+              </a:rPr>
+              <a:t>}</a:t>
+            </a:r>
+          </a:p>
+        </p:txBody>
+      </p:sp>
+    </p:spTree>
+    <p:extLst>
+      <p:ext uri="{BB962C8B-B14F-4D97-AF65-F5344CB8AC3E}">
+        <p14:creationId xmlns:p14="http://schemas.microsoft.com/office/powerpoint/2010/main" val="968211817"/>
       </p:ext>
     </p:extLst>
   </p:cSld>

</xml_diff>